<commit_message>
cambios para la presentacion
</commit_message>
<xml_diff>
--- a/presentacion/demo_day.pptx
+++ b/presentacion/demo_day.pptx
@@ -5,49 +5,50 @@
     <p:sldMasterId id="2147483648" r:id="rId1"/>
   </p:sldMasterIdLst>
   <p:notesMasterIdLst>
-    <p:notesMasterId r:id="rId11"/>
+    <p:notesMasterId r:id="rId12"/>
   </p:notesMasterIdLst>
   <p:sldIdLst>
     <p:sldId id="256" r:id="rId2"/>
     <p:sldId id="257" r:id="rId3"/>
     <p:sldId id="259" r:id="rId4"/>
-    <p:sldId id="260" r:id="rId5"/>
-    <p:sldId id="261" r:id="rId6"/>
-    <p:sldId id="262" r:id="rId7"/>
-    <p:sldId id="263" r:id="rId8"/>
-    <p:sldId id="264" r:id="rId9"/>
-    <p:sldId id="276" r:id="rId10"/>
+    <p:sldId id="261" r:id="rId5"/>
+    <p:sldId id="265" r:id="rId6"/>
+    <p:sldId id="277" r:id="rId7"/>
+    <p:sldId id="262" r:id="rId8"/>
+    <p:sldId id="263" r:id="rId9"/>
+    <p:sldId id="264" r:id="rId10"/>
+    <p:sldId id="276" r:id="rId11"/>
   </p:sldIdLst>
   <p:sldSz cx="15122525" cy="7921625"/>
   <p:notesSz cx="6858000" cy="9144000"/>
   <p:embeddedFontLst>
     <p:embeddedFont>
       <p:font typeface="Calibri" panose="020F0502020204030204" pitchFamily="34" charset="0"/>
-      <p:regular r:id="rId12"/>
-      <p:bold r:id="rId13"/>
-      <p:italic r:id="rId14"/>
-      <p:boldItalic r:id="rId15"/>
+      <p:regular r:id="rId13"/>
+      <p:bold r:id="rId14"/>
+      <p:italic r:id="rId15"/>
+      <p:boldItalic r:id="rId16"/>
     </p:embeddedFont>
     <p:embeddedFont>
       <p:font typeface="Montserrat" panose="020B0604020202020204" charset="0"/>
-      <p:regular r:id="rId16"/>
-      <p:bold r:id="rId17"/>
-      <p:italic r:id="rId18"/>
-      <p:boldItalic r:id="rId19"/>
+      <p:regular r:id="rId17"/>
+      <p:bold r:id="rId18"/>
+      <p:italic r:id="rId19"/>
+      <p:boldItalic r:id="rId20"/>
     </p:embeddedFont>
     <p:embeddedFont>
       <p:font typeface="Montserrat Medium" panose="020B0604020202020204" charset="0"/>
-      <p:regular r:id="rId20"/>
-      <p:bold r:id="rId21"/>
-      <p:italic r:id="rId22"/>
-      <p:boldItalic r:id="rId23"/>
+      <p:regular r:id="rId21"/>
+      <p:bold r:id="rId22"/>
+      <p:italic r:id="rId23"/>
+      <p:boldItalic r:id="rId24"/>
     </p:embeddedFont>
     <p:embeddedFont>
       <p:font typeface="Montserrat SemiBold" panose="020B0604020202020204" charset="0"/>
-      <p:regular r:id="rId24"/>
-      <p:bold r:id="rId25"/>
-      <p:italic r:id="rId26"/>
-      <p:boldItalic r:id="rId27"/>
+      <p:regular r:id="rId25"/>
+      <p:bold r:id="rId26"/>
+      <p:italic r:id="rId27"/>
+      <p:boldItalic r:id="rId28"/>
     </p:embeddedFont>
   </p:embeddedFontLst>
   <p:defaultTextStyle>
@@ -295,7 +296,7 @@
       </p15:sldGuideLst>
     </p:ext>
     <p:ext uri="http://customooxmlschemas.google.com/">
-      <go:slidesCustomData xmlns:go="http://customooxmlschemas.google.com/" xmlns:ahyp="http://schemas.microsoft.com/office/drawing/2018/hyperlinkcolor" xmlns:p15="http://schemas.microsoft.com/office/powerpoint/2012/main" xmlns:p14="http://schemas.microsoft.com/office/powerpoint/2010/main" xmlns:com="http://schemas.openxmlformats.org/drawingml/2006/compatibility" xmlns:pvml="urn:schemas-microsoft-com:office:powerpoint" xmlns:v="urn:schemas-microsoft-com:vml" xmlns:o="urn:schemas-microsoft-com:office:office" xmlns:dgm="http://schemas.openxmlformats.org/drawingml/2006/diagram" xmlns:c="http://schemas.openxmlformats.org/drawingml/2006/chart" xmlns:mv="urn:schemas-microsoft-com:mac:vml" xmlns:mc="http://schemas.openxmlformats.org/markup-compatibility/2006" xmlns="" r:id="rId39" roundtripDataSignature="AMtx7miqahxKyyA9P4sTN13lqNjN90CSMg=="/>
+      <go:slidesCustomData xmlns="" xmlns:mc="http://schemas.openxmlformats.org/markup-compatibility/2006" xmlns:mv="urn:schemas-microsoft-com:mac:vml" xmlns:c="http://schemas.openxmlformats.org/drawingml/2006/chart" xmlns:dgm="http://schemas.openxmlformats.org/drawingml/2006/diagram" xmlns:o="urn:schemas-microsoft-com:office:office" xmlns:v="urn:schemas-microsoft-com:vml" xmlns:pvml="urn:schemas-microsoft-com:office:powerpoint" xmlns:com="http://schemas.openxmlformats.org/drawingml/2006/compatibility" xmlns:p14="http://schemas.microsoft.com/office/powerpoint/2010/main" xmlns:p15="http://schemas.microsoft.com/office/powerpoint/2012/main" xmlns:ahyp="http://schemas.microsoft.com/office/drawing/2018/hyperlinkcolor" xmlns:go="http://customooxmlschemas.google.com/" r:id="rId39" roundtripDataSignature="AMtx7miqahxKyyA9P4sTN13lqNjN90CSMg=="/>
     </p:ext>
   </p:extLst>
 </p:presentation>
@@ -1876,6 +1877,176 @@
 </p:notes>
 </file>
 
+<file path=ppt/notesSlides/notesSlide10.xml><?xml version="1.0" encoding="utf-8"?>
+<p:notes xmlns:a="http://schemas.openxmlformats.org/drawingml/2006/main" xmlns:r="http://schemas.openxmlformats.org/officeDocument/2006/relationships" xmlns:p="http://schemas.openxmlformats.org/presentationml/2006/main" showMasterSp="0" showMasterPhAnim="0">
+  <p:cSld>
+    <p:spTree>
+      <p:nvGrpSpPr>
+        <p:cNvPr id="1" name="Shape 372"/>
+        <p:cNvGrpSpPr/>
+        <p:nvPr/>
+      </p:nvGrpSpPr>
+      <p:grpSpPr>
+        <a:xfrm>
+          <a:off x="0" y="0"/>
+          <a:ext cx="0" cy="0"/>
+          <a:chOff x="0" y="0"/>
+          <a:chExt cx="0" cy="0"/>
+        </a:xfrm>
+      </p:grpSpPr>
+      <p:sp>
+        <p:nvSpPr>
+          <p:cNvPr id="373" name="Google Shape;373;g7ed7eb645d_0_992:notes"/>
+          <p:cNvSpPr>
+            <a:spLocks noGrp="1" noRot="1" noChangeAspect="1"/>
+          </p:cNvSpPr>
+          <p:nvPr>
+            <p:ph type="sldImg" idx="2"/>
+          </p:nvPr>
+        </p:nvSpPr>
+        <p:spPr>
+          <a:xfrm>
+            <a:off x="155575" y="685800"/>
+            <a:ext cx="6546850" cy="3429000"/>
+          </a:xfrm>
+          <a:custGeom>
+            <a:avLst/>
+            <a:gdLst/>
+            <a:ahLst/>
+            <a:cxnLst/>
+            <a:rect l="l" t="t" r="r" b="b"/>
+            <a:pathLst>
+              <a:path w="120000" h="120000" extrusionOk="0">
+                <a:moveTo>
+                  <a:pt x="0" y="0"/>
+                </a:moveTo>
+                <a:lnTo>
+                  <a:pt x="120000" y="0"/>
+                </a:lnTo>
+                <a:lnTo>
+                  <a:pt x="120000" y="120000"/>
+                </a:lnTo>
+                <a:lnTo>
+                  <a:pt x="0" y="120000"/>
+                </a:lnTo>
+                <a:close/>
+              </a:path>
+            </a:pathLst>
+          </a:custGeom>
+          <a:noFill/>
+          <a:ln w="12700" cap="flat" cmpd="sng">
+            <a:solidFill>
+              <a:srgbClr val="000000"/>
+            </a:solidFill>
+            <a:prstDash val="solid"/>
+            <a:round/>
+            <a:headEnd type="none" w="sm" len="sm"/>
+            <a:tailEnd type="none" w="sm" len="sm"/>
+          </a:ln>
+        </p:spPr>
+      </p:sp>
+      <p:sp>
+        <p:nvSpPr>
+          <p:cNvPr id="374" name="Google Shape;374;g7ed7eb645d_0_992:notes"/>
+          <p:cNvSpPr txBox="1">
+            <a:spLocks noGrp="1"/>
+          </p:cNvSpPr>
+          <p:nvPr>
+            <p:ph type="body" idx="1"/>
+          </p:nvPr>
+        </p:nvSpPr>
+        <p:spPr>
+          <a:xfrm>
+            <a:off x="685800" y="4343400"/>
+            <a:ext cx="5486400" cy="4114800"/>
+          </a:xfrm>
+          <a:prstGeom prst="rect">
+            <a:avLst/>
+          </a:prstGeom>
+          <a:noFill/>
+          <a:ln>
+            <a:noFill/>
+          </a:ln>
+        </p:spPr>
+        <p:txBody>
+          <a:bodyPr spcFirstLastPara="1" wrap="square" lIns="91425" tIns="45700" rIns="91425" bIns="45700" anchor="t" anchorCtr="0">
+            <a:noAutofit/>
+          </a:bodyPr>
+          <a:lstStyle/>
+          <a:p>
+            <a:pPr marL="0" lvl="0" indent="0" algn="l" rtl="0">
+              <a:lnSpc>
+                <a:spcPct val="100000"/>
+              </a:lnSpc>
+              <a:spcBef>
+                <a:spcPts val="0"/>
+              </a:spcBef>
+              <a:spcAft>
+                <a:spcPts val="0"/>
+              </a:spcAft>
+              <a:buClr>
+                <a:schemeClr val="dk1"/>
+              </a:buClr>
+              <a:buSzPts val="1400"/>
+              <a:buFont typeface="Arial"/>
+              <a:buNone/>
+            </a:pPr>
+            <a:r>
+              <a:rPr lang="es-MX"/>
+              <a:t>Copia el elemento: CTRL C</a:t>
+            </a:r>
+            <a:endParaRPr/>
+          </a:p>
+          <a:p>
+            <a:pPr marL="0" lvl="0" indent="0" algn="l" rtl="0">
+              <a:lnSpc>
+                <a:spcPct val="100000"/>
+              </a:lnSpc>
+              <a:spcBef>
+                <a:spcPts val="0"/>
+              </a:spcBef>
+              <a:spcAft>
+                <a:spcPts val="0"/>
+              </a:spcAft>
+              <a:buClr>
+                <a:schemeClr val="dk1"/>
+              </a:buClr>
+              <a:buSzPts val="1400"/>
+              <a:buFont typeface="Arial"/>
+              <a:buNone/>
+            </a:pPr>
+            <a:r>
+              <a:rPr lang="es-MX"/>
+              <a:t>Pega en la diapositiva que lo necesites: CTRL V</a:t>
+            </a:r>
+            <a:endParaRPr/>
+          </a:p>
+          <a:p>
+            <a:pPr marL="0" lvl="0" indent="0" algn="l" rtl="0">
+              <a:lnSpc>
+                <a:spcPct val="100000"/>
+              </a:lnSpc>
+              <a:spcBef>
+                <a:spcPts val="0"/>
+              </a:spcBef>
+              <a:spcAft>
+                <a:spcPts val="0"/>
+              </a:spcAft>
+              <a:buSzPts val="1400"/>
+              <a:buNone/>
+            </a:pPr>
+            <a:endParaRPr/>
+          </a:p>
+        </p:txBody>
+      </p:sp>
+    </p:spTree>
+  </p:cSld>
+  <p:clrMapOvr>
+    <a:masterClrMapping/>
+  </p:clrMapOvr>
+</p:notes>
+</file>
+
 <file path=ppt/notesSlides/notesSlide2.xml><?xml version="1.0" encoding="utf-8"?>
 <p:notes xmlns:a="http://schemas.openxmlformats.org/drawingml/2006/main" xmlns:r="http://schemas.openxmlformats.org/officeDocument/2006/relationships" xmlns:p="http://schemas.openxmlformats.org/presentationml/2006/main" showMasterSp="0" showMasterPhAnim="0">
   <p:cSld>
@@ -2125,148 +2296,6 @@
   <p:cSld>
     <p:spTree>
       <p:nvGrpSpPr>
-        <p:cNvPr id="1" name="Shape 96"/>
-        <p:cNvGrpSpPr/>
-        <p:nvPr/>
-      </p:nvGrpSpPr>
-      <p:grpSpPr>
-        <a:xfrm>
-          <a:off x="0" y="0"/>
-          <a:ext cx="0" cy="0"/>
-          <a:chOff x="0" y="0"/>
-          <a:chExt cx="0" cy="0"/>
-        </a:xfrm>
-      </p:grpSpPr>
-      <p:sp>
-        <p:nvSpPr>
-          <p:cNvPr id="97" name="Google Shape;97;g7ed7eb645d_0_749:notes"/>
-          <p:cNvSpPr>
-            <a:spLocks noGrp="1" noRot="1" noChangeAspect="1"/>
-          </p:cNvSpPr>
-          <p:nvPr>
-            <p:ph type="sldImg" idx="2"/>
-          </p:nvPr>
-        </p:nvSpPr>
-        <p:spPr>
-          <a:xfrm>
-            <a:off x="155575" y="685800"/>
-            <a:ext cx="6546850" cy="3429000"/>
-          </a:xfrm>
-          <a:custGeom>
-            <a:avLst/>
-            <a:gdLst/>
-            <a:ahLst/>
-            <a:cxnLst/>
-            <a:rect l="l" t="t" r="r" b="b"/>
-            <a:pathLst>
-              <a:path w="120000" h="120000" extrusionOk="0">
-                <a:moveTo>
-                  <a:pt x="0" y="0"/>
-                </a:moveTo>
-                <a:lnTo>
-                  <a:pt x="120000" y="0"/>
-                </a:lnTo>
-                <a:lnTo>
-                  <a:pt x="120000" y="120000"/>
-                </a:lnTo>
-                <a:lnTo>
-                  <a:pt x="0" y="120000"/>
-                </a:lnTo>
-                <a:close/>
-              </a:path>
-            </a:pathLst>
-          </a:custGeom>
-          <a:noFill/>
-          <a:ln w="12700" cap="flat" cmpd="sng">
-            <a:solidFill>
-              <a:srgbClr val="000000"/>
-            </a:solidFill>
-            <a:prstDash val="solid"/>
-            <a:round/>
-            <a:headEnd type="none" w="sm" len="sm"/>
-            <a:tailEnd type="none" w="sm" len="sm"/>
-          </a:ln>
-        </p:spPr>
-      </p:sp>
-      <p:sp>
-        <p:nvSpPr>
-          <p:cNvPr id="98" name="Google Shape;98;g7ed7eb645d_0_749:notes"/>
-          <p:cNvSpPr txBox="1">
-            <a:spLocks noGrp="1"/>
-          </p:cNvSpPr>
-          <p:nvPr>
-            <p:ph type="body" idx="1"/>
-          </p:nvPr>
-        </p:nvSpPr>
-        <p:spPr>
-          <a:xfrm>
-            <a:off x="685800" y="4343400"/>
-            <a:ext cx="5486400" cy="4114800"/>
-          </a:xfrm>
-          <a:prstGeom prst="rect">
-            <a:avLst/>
-          </a:prstGeom>
-          <a:noFill/>
-          <a:ln>
-            <a:noFill/>
-          </a:ln>
-        </p:spPr>
-        <p:txBody>
-          <a:bodyPr spcFirstLastPara="1" wrap="square" lIns="91425" tIns="45700" rIns="91425" bIns="45700" anchor="t" anchorCtr="0">
-            <a:noAutofit/>
-          </a:bodyPr>
-          <a:lstStyle/>
-          <a:p>
-            <a:pPr marL="0" lvl="0" indent="0" algn="l" rtl="0">
-              <a:lnSpc>
-                <a:spcPct val="100000"/>
-              </a:lnSpc>
-              <a:spcBef>
-                <a:spcPts val="0"/>
-              </a:spcBef>
-              <a:spcAft>
-                <a:spcPts val="0"/>
-              </a:spcAft>
-              <a:buSzPts val="1400"/>
-              <a:buNone/>
-            </a:pPr>
-            <a:r>
-              <a:rPr lang="es-MX"/>
-              <a:t>Frase</a:t>
-            </a:r>
-            <a:endParaRPr/>
-          </a:p>
-          <a:p>
-            <a:pPr marL="0" lvl="0" indent="0" algn="l" rtl="0">
-              <a:lnSpc>
-                <a:spcPct val="100000"/>
-              </a:lnSpc>
-              <a:spcBef>
-                <a:spcPts val="0"/>
-              </a:spcBef>
-              <a:spcAft>
-                <a:spcPts val="0"/>
-              </a:spcAft>
-              <a:buSzPts val="1400"/>
-              <a:buNone/>
-            </a:pPr>
-            <a:endParaRPr/>
-          </a:p>
-        </p:txBody>
-      </p:sp>
-    </p:spTree>
-  </p:cSld>
-  <p:clrMapOvr>
-    <a:masterClrMapping/>
-  </p:clrMapOvr>
-</p:notes>
-</file>
-
-<file path=ppt/notesSlides/notesSlide5.xml><?xml version="1.0" encoding="utf-8"?>
-<p:notes xmlns:a="http://schemas.openxmlformats.org/drawingml/2006/main" xmlns:r="http://schemas.openxmlformats.org/officeDocument/2006/relationships" xmlns:p="http://schemas.openxmlformats.org/presentationml/2006/main" showMasterSp="0" showMasterPhAnim="0">
-  <p:cSld>
-    <p:spTree>
-      <p:nvGrpSpPr>
         <p:cNvPr id="1" name="Shape 105"/>
         <p:cNvGrpSpPr/>
         <p:nvPr/>
@@ -2423,7 +2452,256 @@
 </p:notes>
 </file>
 
+<file path=ppt/notesSlides/notesSlide5.xml><?xml version="1.0" encoding="utf-8"?>
+<p:notes xmlns:a="http://schemas.openxmlformats.org/drawingml/2006/main" xmlns:r="http://schemas.openxmlformats.org/officeDocument/2006/relationships" xmlns:p="http://schemas.openxmlformats.org/presentationml/2006/main" showMasterSp="0" showMasterPhAnim="0">
+  <p:cSld>
+    <p:spTree>
+      <p:nvGrpSpPr>
+        <p:cNvPr id="1" name="Shape 153"/>
+        <p:cNvGrpSpPr/>
+        <p:nvPr/>
+      </p:nvGrpSpPr>
+      <p:grpSpPr>
+        <a:xfrm>
+          <a:off x="0" y="0"/>
+          <a:ext cx="0" cy="0"/>
+          <a:chOff x="0" y="0"/>
+          <a:chExt cx="0" cy="0"/>
+        </a:xfrm>
+      </p:grpSpPr>
+      <p:sp>
+        <p:nvSpPr>
+          <p:cNvPr id="154" name="Google Shape;154;g7ed7eb645d_0_804:notes"/>
+          <p:cNvSpPr>
+            <a:spLocks noGrp="1" noRot="1" noChangeAspect="1"/>
+          </p:cNvSpPr>
+          <p:nvPr>
+            <p:ph type="sldImg" idx="2"/>
+          </p:nvPr>
+        </p:nvSpPr>
+        <p:spPr>
+          <a:xfrm>
+            <a:off x="155575" y="685800"/>
+            <a:ext cx="6546850" cy="3429000"/>
+          </a:xfrm>
+          <a:custGeom>
+            <a:avLst/>
+            <a:gdLst/>
+            <a:ahLst/>
+            <a:cxnLst/>
+            <a:rect l="l" t="t" r="r" b="b"/>
+            <a:pathLst>
+              <a:path w="120000" h="120000" extrusionOk="0">
+                <a:moveTo>
+                  <a:pt x="0" y="0"/>
+                </a:moveTo>
+                <a:lnTo>
+                  <a:pt x="120000" y="0"/>
+                </a:lnTo>
+                <a:lnTo>
+                  <a:pt x="120000" y="120000"/>
+                </a:lnTo>
+                <a:lnTo>
+                  <a:pt x="0" y="120000"/>
+                </a:lnTo>
+                <a:close/>
+              </a:path>
+            </a:pathLst>
+          </a:custGeom>
+          <a:noFill/>
+          <a:ln w="12700" cap="flat" cmpd="sng">
+            <a:solidFill>
+              <a:srgbClr val="000000"/>
+            </a:solidFill>
+            <a:prstDash val="solid"/>
+            <a:round/>
+            <a:headEnd type="none" w="sm" len="sm"/>
+            <a:tailEnd type="none" w="sm" len="sm"/>
+          </a:ln>
+        </p:spPr>
+      </p:sp>
+      <p:sp>
+        <p:nvSpPr>
+          <p:cNvPr id="155" name="Google Shape;155;g7ed7eb645d_0_804:notes"/>
+          <p:cNvSpPr txBox="1">
+            <a:spLocks noGrp="1"/>
+          </p:cNvSpPr>
+          <p:nvPr>
+            <p:ph type="body" idx="1"/>
+          </p:nvPr>
+        </p:nvSpPr>
+        <p:spPr>
+          <a:xfrm>
+            <a:off x="685800" y="4343400"/>
+            <a:ext cx="5486400" cy="4114800"/>
+          </a:xfrm>
+          <a:prstGeom prst="rect">
+            <a:avLst/>
+          </a:prstGeom>
+          <a:noFill/>
+          <a:ln>
+            <a:noFill/>
+          </a:ln>
+        </p:spPr>
+        <p:txBody>
+          <a:bodyPr spcFirstLastPara="1" wrap="square" lIns="91425" tIns="45700" rIns="91425" bIns="45700" anchor="t" anchorCtr="0">
+            <a:noAutofit/>
+          </a:bodyPr>
+          <a:lstStyle/>
+          <a:p>
+            <a:pPr marL="0" lvl="0" indent="0" algn="l" rtl="0">
+              <a:lnSpc>
+                <a:spcPct val="100000"/>
+              </a:lnSpc>
+              <a:spcBef>
+                <a:spcPts val="0"/>
+              </a:spcBef>
+              <a:spcAft>
+                <a:spcPts val="0"/>
+              </a:spcAft>
+              <a:buSzPts val="1400"/>
+              <a:buNone/>
+            </a:pPr>
+            <a:endParaRPr/>
+          </a:p>
+        </p:txBody>
+      </p:sp>
+    </p:spTree>
+  </p:cSld>
+  <p:clrMapOvr>
+    <a:masterClrMapping/>
+  </p:clrMapOvr>
+</p:notes>
+</file>
+
 <file path=ppt/notesSlides/notesSlide6.xml><?xml version="1.0" encoding="utf-8"?>
+<p:notes xmlns:a="http://schemas.openxmlformats.org/drawingml/2006/main" xmlns:r="http://schemas.openxmlformats.org/officeDocument/2006/relationships" xmlns:p="http://schemas.openxmlformats.org/presentationml/2006/main" showMasterSp="0" showMasterPhAnim="0">
+  <p:cSld>
+    <p:spTree>
+      <p:nvGrpSpPr>
+        <p:cNvPr id="1" name="Shape 153"/>
+        <p:cNvGrpSpPr/>
+        <p:nvPr/>
+      </p:nvGrpSpPr>
+      <p:grpSpPr>
+        <a:xfrm>
+          <a:off x="0" y="0"/>
+          <a:ext cx="0" cy="0"/>
+          <a:chOff x="0" y="0"/>
+          <a:chExt cx="0" cy="0"/>
+        </a:xfrm>
+      </p:grpSpPr>
+      <p:sp>
+        <p:nvSpPr>
+          <p:cNvPr id="154" name="Google Shape;154;g7ed7eb645d_0_804:notes"/>
+          <p:cNvSpPr>
+            <a:spLocks noGrp="1" noRot="1" noChangeAspect="1"/>
+          </p:cNvSpPr>
+          <p:nvPr>
+            <p:ph type="sldImg" idx="2"/>
+          </p:nvPr>
+        </p:nvSpPr>
+        <p:spPr>
+          <a:xfrm>
+            <a:off x="155575" y="685800"/>
+            <a:ext cx="6546850" cy="3429000"/>
+          </a:xfrm>
+          <a:custGeom>
+            <a:avLst/>
+            <a:gdLst/>
+            <a:ahLst/>
+            <a:cxnLst/>
+            <a:rect l="l" t="t" r="r" b="b"/>
+            <a:pathLst>
+              <a:path w="120000" h="120000" extrusionOk="0">
+                <a:moveTo>
+                  <a:pt x="0" y="0"/>
+                </a:moveTo>
+                <a:lnTo>
+                  <a:pt x="120000" y="0"/>
+                </a:lnTo>
+                <a:lnTo>
+                  <a:pt x="120000" y="120000"/>
+                </a:lnTo>
+                <a:lnTo>
+                  <a:pt x="0" y="120000"/>
+                </a:lnTo>
+                <a:close/>
+              </a:path>
+            </a:pathLst>
+          </a:custGeom>
+          <a:noFill/>
+          <a:ln w="12700" cap="flat" cmpd="sng">
+            <a:solidFill>
+              <a:srgbClr val="000000"/>
+            </a:solidFill>
+            <a:prstDash val="solid"/>
+            <a:round/>
+            <a:headEnd type="none" w="sm" len="sm"/>
+            <a:tailEnd type="none" w="sm" len="sm"/>
+          </a:ln>
+        </p:spPr>
+      </p:sp>
+      <p:sp>
+        <p:nvSpPr>
+          <p:cNvPr id="155" name="Google Shape;155;g7ed7eb645d_0_804:notes"/>
+          <p:cNvSpPr txBox="1">
+            <a:spLocks noGrp="1"/>
+          </p:cNvSpPr>
+          <p:nvPr>
+            <p:ph type="body" idx="1"/>
+          </p:nvPr>
+        </p:nvSpPr>
+        <p:spPr>
+          <a:xfrm>
+            <a:off x="685800" y="4343400"/>
+            <a:ext cx="5486400" cy="4114800"/>
+          </a:xfrm>
+          <a:prstGeom prst="rect">
+            <a:avLst/>
+          </a:prstGeom>
+          <a:noFill/>
+          <a:ln>
+            <a:noFill/>
+          </a:ln>
+        </p:spPr>
+        <p:txBody>
+          <a:bodyPr spcFirstLastPara="1" wrap="square" lIns="91425" tIns="45700" rIns="91425" bIns="45700" anchor="t" anchorCtr="0">
+            <a:noAutofit/>
+          </a:bodyPr>
+          <a:lstStyle/>
+          <a:p>
+            <a:pPr marL="0" lvl="0" indent="0" algn="l" rtl="0">
+              <a:lnSpc>
+                <a:spcPct val="100000"/>
+              </a:lnSpc>
+              <a:spcBef>
+                <a:spcPts val="0"/>
+              </a:spcBef>
+              <a:spcAft>
+                <a:spcPts val="0"/>
+              </a:spcAft>
+              <a:buSzPts val="1400"/>
+              <a:buNone/>
+            </a:pPr>
+            <a:endParaRPr/>
+          </a:p>
+        </p:txBody>
+      </p:sp>
+    </p:spTree>
+    <p:extLst>
+      <p:ext uri="{BB962C8B-B14F-4D97-AF65-F5344CB8AC3E}">
+        <p14:creationId xmlns:p14="http://schemas.microsoft.com/office/powerpoint/2010/main" val="3201418726"/>
+      </p:ext>
+    </p:extLst>
+  </p:cSld>
+  <p:clrMapOvr>
+    <a:masterClrMapping/>
+  </p:clrMapOvr>
+</p:notes>
+</file>
+
+<file path=ppt/notesSlides/notesSlide7.xml><?xml version="1.0" encoding="utf-8"?>
 <p:notes xmlns:a="http://schemas.openxmlformats.org/drawingml/2006/main" xmlns:r="http://schemas.openxmlformats.org/officeDocument/2006/relationships" xmlns:p="http://schemas.openxmlformats.org/presentationml/2006/main" showMasterSp="0" showMasterPhAnim="0">
   <p:cSld>
     <p:spTree>
@@ -2616,7 +2894,7 @@
 </p:notes>
 </file>
 
-<file path=ppt/notesSlides/notesSlide7.xml><?xml version="1.0" encoding="utf-8"?>
+<file path=ppt/notesSlides/notesSlide8.xml><?xml version="1.0" encoding="utf-8"?>
 <p:notes xmlns:a="http://schemas.openxmlformats.org/drawingml/2006/main" xmlns:r="http://schemas.openxmlformats.org/officeDocument/2006/relationships" xmlns:p="http://schemas.openxmlformats.org/presentationml/2006/main" showMasterSp="0" showMasterPhAnim="0">
   <p:cSld>
     <p:spTree>
@@ -2809,7 +3087,7 @@
 </p:notes>
 </file>
 
-<file path=ppt/notesSlides/notesSlide8.xml><?xml version="1.0" encoding="utf-8"?>
+<file path=ppt/notesSlides/notesSlide9.xml><?xml version="1.0" encoding="utf-8"?>
 <p:notes xmlns:a="http://schemas.openxmlformats.org/drawingml/2006/main" xmlns:r="http://schemas.openxmlformats.org/officeDocument/2006/relationships" xmlns:p="http://schemas.openxmlformats.org/presentationml/2006/main" showMasterSp="0" showMasterPhAnim="0">
   <p:cSld>
     <p:spTree>
@@ -2905,176 +3183,6 @@
             <a:noAutofit/>
           </a:bodyPr>
           <a:lstStyle/>
-          <a:p>
-            <a:pPr marL="0" lvl="0" indent="0" algn="l" rtl="0">
-              <a:lnSpc>
-                <a:spcPct val="100000"/>
-              </a:lnSpc>
-              <a:spcBef>
-                <a:spcPts val="0"/>
-              </a:spcBef>
-              <a:spcAft>
-                <a:spcPts val="0"/>
-              </a:spcAft>
-              <a:buSzPts val="1400"/>
-              <a:buNone/>
-            </a:pPr>
-            <a:endParaRPr/>
-          </a:p>
-        </p:txBody>
-      </p:sp>
-    </p:spTree>
-  </p:cSld>
-  <p:clrMapOvr>
-    <a:masterClrMapping/>
-  </p:clrMapOvr>
-</p:notes>
-</file>
-
-<file path=ppt/notesSlides/notesSlide9.xml><?xml version="1.0" encoding="utf-8"?>
-<p:notes xmlns:a="http://schemas.openxmlformats.org/drawingml/2006/main" xmlns:r="http://schemas.openxmlformats.org/officeDocument/2006/relationships" xmlns:p="http://schemas.openxmlformats.org/presentationml/2006/main" showMasterSp="0" showMasterPhAnim="0">
-  <p:cSld>
-    <p:spTree>
-      <p:nvGrpSpPr>
-        <p:cNvPr id="1" name="Shape 372"/>
-        <p:cNvGrpSpPr/>
-        <p:nvPr/>
-      </p:nvGrpSpPr>
-      <p:grpSpPr>
-        <a:xfrm>
-          <a:off x="0" y="0"/>
-          <a:ext cx="0" cy="0"/>
-          <a:chOff x="0" y="0"/>
-          <a:chExt cx="0" cy="0"/>
-        </a:xfrm>
-      </p:grpSpPr>
-      <p:sp>
-        <p:nvSpPr>
-          <p:cNvPr id="373" name="Google Shape;373;g7ed7eb645d_0_992:notes"/>
-          <p:cNvSpPr>
-            <a:spLocks noGrp="1" noRot="1" noChangeAspect="1"/>
-          </p:cNvSpPr>
-          <p:nvPr>
-            <p:ph type="sldImg" idx="2"/>
-          </p:nvPr>
-        </p:nvSpPr>
-        <p:spPr>
-          <a:xfrm>
-            <a:off x="155575" y="685800"/>
-            <a:ext cx="6546850" cy="3429000"/>
-          </a:xfrm>
-          <a:custGeom>
-            <a:avLst/>
-            <a:gdLst/>
-            <a:ahLst/>
-            <a:cxnLst/>
-            <a:rect l="l" t="t" r="r" b="b"/>
-            <a:pathLst>
-              <a:path w="120000" h="120000" extrusionOk="0">
-                <a:moveTo>
-                  <a:pt x="0" y="0"/>
-                </a:moveTo>
-                <a:lnTo>
-                  <a:pt x="120000" y="0"/>
-                </a:lnTo>
-                <a:lnTo>
-                  <a:pt x="120000" y="120000"/>
-                </a:lnTo>
-                <a:lnTo>
-                  <a:pt x="0" y="120000"/>
-                </a:lnTo>
-                <a:close/>
-              </a:path>
-            </a:pathLst>
-          </a:custGeom>
-          <a:noFill/>
-          <a:ln w="12700" cap="flat" cmpd="sng">
-            <a:solidFill>
-              <a:srgbClr val="000000"/>
-            </a:solidFill>
-            <a:prstDash val="solid"/>
-            <a:round/>
-            <a:headEnd type="none" w="sm" len="sm"/>
-            <a:tailEnd type="none" w="sm" len="sm"/>
-          </a:ln>
-        </p:spPr>
-      </p:sp>
-      <p:sp>
-        <p:nvSpPr>
-          <p:cNvPr id="374" name="Google Shape;374;g7ed7eb645d_0_992:notes"/>
-          <p:cNvSpPr txBox="1">
-            <a:spLocks noGrp="1"/>
-          </p:cNvSpPr>
-          <p:nvPr>
-            <p:ph type="body" idx="1"/>
-          </p:nvPr>
-        </p:nvSpPr>
-        <p:spPr>
-          <a:xfrm>
-            <a:off x="685800" y="4343400"/>
-            <a:ext cx="5486400" cy="4114800"/>
-          </a:xfrm>
-          <a:prstGeom prst="rect">
-            <a:avLst/>
-          </a:prstGeom>
-          <a:noFill/>
-          <a:ln>
-            <a:noFill/>
-          </a:ln>
-        </p:spPr>
-        <p:txBody>
-          <a:bodyPr spcFirstLastPara="1" wrap="square" lIns="91425" tIns="45700" rIns="91425" bIns="45700" anchor="t" anchorCtr="0">
-            <a:noAutofit/>
-          </a:bodyPr>
-          <a:lstStyle/>
-          <a:p>
-            <a:pPr marL="0" lvl="0" indent="0" algn="l" rtl="0">
-              <a:lnSpc>
-                <a:spcPct val="100000"/>
-              </a:lnSpc>
-              <a:spcBef>
-                <a:spcPts val="0"/>
-              </a:spcBef>
-              <a:spcAft>
-                <a:spcPts val="0"/>
-              </a:spcAft>
-              <a:buClr>
-                <a:schemeClr val="dk1"/>
-              </a:buClr>
-              <a:buSzPts val="1400"/>
-              <a:buFont typeface="Arial"/>
-              <a:buNone/>
-            </a:pPr>
-            <a:r>
-              <a:rPr lang="es-MX"/>
-              <a:t>Copia el elemento: CTRL C</a:t>
-            </a:r>
-            <a:endParaRPr/>
-          </a:p>
-          <a:p>
-            <a:pPr marL="0" lvl="0" indent="0" algn="l" rtl="0">
-              <a:lnSpc>
-                <a:spcPct val="100000"/>
-              </a:lnSpc>
-              <a:spcBef>
-                <a:spcPts val="0"/>
-              </a:spcBef>
-              <a:spcAft>
-                <a:spcPts val="0"/>
-              </a:spcAft>
-              <a:buClr>
-                <a:schemeClr val="dk1"/>
-              </a:buClr>
-              <a:buSzPts val="1400"/>
-              <a:buFont typeface="Arial"/>
-              <a:buNone/>
-            </a:pPr>
-            <a:r>
-              <a:rPr lang="es-MX"/>
-              <a:t>Pega en la diapositiva que lo necesites: CTRL V</a:t>
-            </a:r>
-            <a:endParaRPr/>
-          </a:p>
           <a:p>
             <a:pPr marL="0" lvl="0" indent="0" algn="l" rtl="0">
               <a:lnSpc>
@@ -11179,6 +11287,250 @@
 </p:sld>
 </file>
 
+<file path=ppt/slides/slide10.xml><?xml version="1.0" encoding="utf-8"?>
+<p:sld xmlns:a="http://schemas.openxmlformats.org/drawingml/2006/main" xmlns:r="http://schemas.openxmlformats.org/officeDocument/2006/relationships" xmlns:p="http://schemas.openxmlformats.org/presentationml/2006/main">
+  <p:cSld>
+    <p:bg>
+      <p:bgPr>
+        <a:solidFill>
+          <a:srgbClr val="4B22F4"/>
+        </a:solidFill>
+        <a:effectLst/>
+      </p:bgPr>
+    </p:bg>
+    <p:spTree>
+      <p:nvGrpSpPr>
+        <p:cNvPr id="1" name="Shape 375"/>
+        <p:cNvGrpSpPr/>
+        <p:nvPr/>
+      </p:nvGrpSpPr>
+      <p:grpSpPr>
+        <a:xfrm>
+          <a:off x="0" y="0"/>
+          <a:ext cx="0" cy="0"/>
+          <a:chOff x="0" y="0"/>
+          <a:chExt cx="0" cy="0"/>
+        </a:xfrm>
+      </p:grpSpPr>
+      <p:pic>
+        <p:nvPicPr>
+          <p:cNvPr id="427" name="Google Shape;427;g7ed7eb645d_0_992"/>
+          <p:cNvPicPr preferRelativeResize="0"/>
+          <p:nvPr/>
+        </p:nvPicPr>
+        <p:blipFill rotWithShape="1">
+          <a:blip r:embed="rId3">
+            <a:alphaModFix/>
+          </a:blip>
+          <a:srcRect/>
+          <a:stretch/>
+        </p:blipFill>
+        <p:spPr>
+          <a:xfrm flipH="1">
+            <a:off x="498499" y="731301"/>
+            <a:ext cx="1430575" cy="82989"/>
+          </a:xfrm>
+          <a:prstGeom prst="rect">
+            <a:avLst/>
+          </a:prstGeom>
+          <a:noFill/>
+          <a:ln>
+            <a:noFill/>
+          </a:ln>
+        </p:spPr>
+      </p:pic>
+      <p:sp>
+        <p:nvSpPr>
+          <p:cNvPr id="428" name="Google Shape;428;g7ed7eb645d_0_992"/>
+          <p:cNvSpPr txBox="1"/>
+          <p:nvPr/>
+        </p:nvSpPr>
+        <p:spPr>
+          <a:xfrm>
+            <a:off x="5257444" y="3893494"/>
+            <a:ext cx="9218400" cy="716700"/>
+          </a:xfrm>
+          <a:prstGeom prst="rect">
+            <a:avLst/>
+          </a:prstGeom>
+          <a:noFill/>
+          <a:ln>
+            <a:noFill/>
+          </a:ln>
+        </p:spPr>
+        <p:txBody>
+          <a:bodyPr spcFirstLastPara="1" wrap="square" lIns="147725" tIns="147725" rIns="147725" bIns="147725" anchor="ctr" anchorCtr="0">
+            <a:noAutofit/>
+          </a:bodyPr>
+          <a:lstStyle/>
+          <a:p>
+            <a:pPr marL="0" marR="0" lvl="0" indent="0" algn="l" rtl="0">
+              <a:lnSpc>
+                <a:spcPct val="100000"/>
+              </a:lnSpc>
+              <a:spcBef>
+                <a:spcPts val="0"/>
+              </a:spcBef>
+              <a:spcAft>
+                <a:spcPts val="0"/>
+              </a:spcAft>
+              <a:buClr>
+                <a:srgbClr val="000000"/>
+              </a:buClr>
+              <a:buSzPts val="4000"/>
+              <a:buFont typeface="Arial"/>
+              <a:buNone/>
+            </a:pPr>
+            <a:r>
+              <a:rPr lang="es-MX" sz="4000" b="1" i="0" u="none" strike="noStrike" cap="none" dirty="0">
+                <a:solidFill>
+                  <a:schemeClr val="lt1"/>
+                </a:solidFill>
+                <a:latin typeface="Montserrat"/>
+                <a:ea typeface="Montserrat"/>
+                <a:cs typeface="Montserrat"/>
+                <a:sym typeface="Montserrat"/>
+              </a:rPr>
+              <a:t>Muchas gracias</a:t>
+            </a:r>
+            <a:endParaRPr sz="4000" b="0" i="0" u="none" strike="noStrike" cap="none" dirty="0">
+              <a:solidFill>
+                <a:schemeClr val="lt1"/>
+              </a:solidFill>
+              <a:latin typeface="Montserrat"/>
+              <a:ea typeface="Montserrat"/>
+              <a:cs typeface="Montserrat"/>
+              <a:sym typeface="Montserrat"/>
+            </a:endParaRPr>
+          </a:p>
+        </p:txBody>
+      </p:sp>
+      <p:cxnSp>
+        <p:nvCxnSpPr>
+          <p:cNvPr id="429" name="Google Shape;429;g7ed7eb645d_0_992"/>
+          <p:cNvCxnSpPr/>
+          <p:nvPr/>
+        </p:nvCxnSpPr>
+        <p:spPr>
+          <a:xfrm>
+            <a:off x="14475844" y="-11"/>
+            <a:ext cx="0" cy="3877500"/>
+          </a:xfrm>
+          <a:prstGeom prst="straightConnector1">
+            <a:avLst/>
+          </a:prstGeom>
+          <a:noFill/>
+          <a:ln w="19050" cap="flat" cmpd="sng">
+            <a:solidFill>
+              <a:srgbClr val="6349FC"/>
+            </a:solidFill>
+            <a:prstDash val="solid"/>
+            <a:round/>
+            <a:headEnd type="none" w="sm" len="sm"/>
+            <a:tailEnd type="none" w="sm" len="sm"/>
+          </a:ln>
+        </p:spPr>
+      </p:cxnSp>
+      <p:cxnSp>
+        <p:nvCxnSpPr>
+          <p:cNvPr id="430" name="Google Shape;430;g7ed7eb645d_0_992"/>
+          <p:cNvCxnSpPr/>
+          <p:nvPr/>
+        </p:nvCxnSpPr>
+        <p:spPr>
+          <a:xfrm>
+            <a:off x="14475850" y="6859925"/>
+            <a:ext cx="0" cy="1061700"/>
+          </a:xfrm>
+          <a:prstGeom prst="straightConnector1">
+            <a:avLst/>
+          </a:prstGeom>
+          <a:noFill/>
+          <a:ln w="19050" cap="flat" cmpd="sng">
+            <a:solidFill>
+              <a:srgbClr val="6349FC"/>
+            </a:solidFill>
+            <a:prstDash val="solid"/>
+            <a:round/>
+            <a:headEnd type="none" w="sm" len="sm"/>
+            <a:tailEnd type="none" w="sm" len="sm"/>
+          </a:ln>
+        </p:spPr>
+      </p:cxnSp>
+      <p:sp>
+        <p:nvSpPr>
+          <p:cNvPr id="431" name="Google Shape;431;g7ed7eb645d_0_992"/>
+          <p:cNvSpPr txBox="1"/>
+          <p:nvPr/>
+        </p:nvSpPr>
+        <p:spPr>
+          <a:xfrm rot="-5400000">
+            <a:off x="12971200" y="5038125"/>
+            <a:ext cx="3009300" cy="657900"/>
+          </a:xfrm>
+          <a:prstGeom prst="rect">
+            <a:avLst/>
+          </a:prstGeom>
+          <a:noFill/>
+          <a:ln>
+            <a:noFill/>
+          </a:ln>
+        </p:spPr>
+        <p:txBody>
+          <a:bodyPr spcFirstLastPara="1" wrap="square" lIns="147725" tIns="147725" rIns="147725" bIns="147725" anchor="t" anchorCtr="0">
+            <a:noAutofit/>
+          </a:bodyPr>
+          <a:lstStyle/>
+          <a:p>
+            <a:pPr marL="0" marR="0" lvl="0" indent="0" algn="ctr" rtl="0">
+              <a:lnSpc>
+                <a:spcPct val="100000"/>
+              </a:lnSpc>
+              <a:spcBef>
+                <a:spcPts val="0"/>
+              </a:spcBef>
+              <a:spcAft>
+                <a:spcPts val="0"/>
+              </a:spcAft>
+              <a:buClr>
+                <a:srgbClr val="000000"/>
+              </a:buClr>
+              <a:buSzPts val="2300"/>
+              <a:buFont typeface="Arial"/>
+              <a:buNone/>
+            </a:pPr>
+            <a:r>
+              <a:rPr lang="es-MX" sz="2300" b="0" i="0" u="none" strike="noStrike" cap="none">
+                <a:solidFill>
+                  <a:schemeClr val="lt1"/>
+                </a:solidFill>
+                <a:latin typeface="Montserrat"/>
+                <a:ea typeface="Montserrat"/>
+                <a:cs typeface="Montserrat"/>
+                <a:sym typeface="Montserrat"/>
+              </a:rPr>
+              <a:t>Fondo de color</a:t>
+            </a:r>
+            <a:endParaRPr sz="2300" b="0" i="0" u="none" strike="noStrike" cap="none">
+              <a:solidFill>
+                <a:schemeClr val="lt1"/>
+              </a:solidFill>
+              <a:latin typeface="Montserrat"/>
+              <a:ea typeface="Montserrat"/>
+              <a:cs typeface="Montserrat"/>
+              <a:sym typeface="Montserrat"/>
+            </a:endParaRPr>
+          </a:p>
+        </p:txBody>
+      </p:sp>
+    </p:spTree>
+  </p:cSld>
+  <p:clrMapOvr>
+    <a:masterClrMapping/>
+  </p:clrMapOvr>
+</p:sld>
+</file>
+
 <file path=ppt/slides/slide2.xml><?xml version="1.0" encoding="utf-8"?>
 <p:sld xmlns:a="http://schemas.openxmlformats.org/drawingml/2006/main" xmlns:r="http://schemas.openxmlformats.org/officeDocument/2006/relationships" xmlns:p="http://schemas.openxmlformats.org/presentationml/2006/main">
   <p:cSld>
@@ -11305,7 +11657,7 @@
         </p:nvCxnSpPr>
         <p:spPr>
           <a:xfrm>
-            <a:off x="5655525" y="4722365"/>
+            <a:off x="5655062" y="4925971"/>
             <a:ext cx="1906200" cy="0"/>
           </a:xfrm>
           <a:prstGeom prst="straightConnector1">
@@ -11423,7 +11775,7 @@
         </p:nvCxnSpPr>
         <p:spPr>
           <a:xfrm>
-            <a:off x="1298678" y="4648152"/>
+            <a:off x="1276907" y="4925971"/>
             <a:ext cx="2896804" cy="0"/>
           </a:xfrm>
           <a:prstGeom prst="straightConnector1">
@@ -11791,252 +12143,6 @@
 <file path=ppt/slides/slide4.xml><?xml version="1.0" encoding="utf-8"?>
 <p:sld xmlns:a="http://schemas.openxmlformats.org/drawingml/2006/main" xmlns:r="http://schemas.openxmlformats.org/officeDocument/2006/relationships" xmlns:p="http://schemas.openxmlformats.org/presentationml/2006/main">
   <p:cSld>
-    <p:bg>
-      <p:bgPr>
-        <a:solidFill>
-          <a:srgbClr val="4B22F4"/>
-        </a:solidFill>
-        <a:effectLst/>
-      </p:bgPr>
-    </p:bg>
-    <p:spTree>
-      <p:nvGrpSpPr>
-        <p:cNvPr id="1" name="Shape 99"/>
-        <p:cNvGrpSpPr/>
-        <p:nvPr/>
-      </p:nvGrpSpPr>
-      <p:grpSpPr>
-        <a:xfrm>
-          <a:off x="0" y="0"/>
-          <a:ext cx="0" cy="0"/>
-          <a:chOff x="0" y="0"/>
-          <a:chExt cx="0" cy="0"/>
-        </a:xfrm>
-      </p:grpSpPr>
-      <p:pic>
-        <p:nvPicPr>
-          <p:cNvPr id="100" name="Google Shape;100;g7ed7eb645d_0_749"/>
-          <p:cNvPicPr preferRelativeResize="0"/>
-          <p:nvPr/>
-        </p:nvPicPr>
-        <p:blipFill rotWithShape="1">
-          <a:blip r:embed="rId3">
-            <a:alphaModFix amt="50000"/>
-          </a:blip>
-          <a:srcRect t="199" b="208"/>
-          <a:stretch/>
-        </p:blipFill>
-        <p:spPr>
-          <a:xfrm>
-            <a:off x="4194263" y="798681"/>
-            <a:ext cx="6734005" cy="6324258"/>
-          </a:xfrm>
-          <a:prstGeom prst="rect">
-            <a:avLst/>
-          </a:prstGeom>
-          <a:noFill/>
-          <a:ln>
-            <a:noFill/>
-          </a:ln>
-        </p:spPr>
-      </p:pic>
-      <p:sp>
-        <p:nvSpPr>
-          <p:cNvPr id="101" name="Google Shape;101;g7ed7eb645d_0_749"/>
-          <p:cNvSpPr txBox="1"/>
-          <p:nvPr/>
-        </p:nvSpPr>
-        <p:spPr>
-          <a:xfrm>
-            <a:off x="2911275" y="2064663"/>
-            <a:ext cx="9300000" cy="3792300"/>
-          </a:xfrm>
-          <a:prstGeom prst="rect">
-            <a:avLst/>
-          </a:prstGeom>
-          <a:noFill/>
-          <a:ln>
-            <a:noFill/>
-          </a:ln>
-        </p:spPr>
-        <p:txBody>
-          <a:bodyPr spcFirstLastPara="1" wrap="square" lIns="147725" tIns="147725" rIns="147725" bIns="147725" anchor="ctr" anchorCtr="0">
-            <a:noAutofit/>
-          </a:bodyPr>
-          <a:lstStyle/>
-          <a:p>
-            <a:pPr marL="0" marR="0" lvl="0" indent="0" algn="ctr" rtl="0">
-              <a:lnSpc>
-                <a:spcPct val="100000"/>
-              </a:lnSpc>
-              <a:spcBef>
-                <a:spcPts val="0"/>
-              </a:spcBef>
-              <a:spcAft>
-                <a:spcPts val="0"/>
-              </a:spcAft>
-              <a:buClr>
-                <a:srgbClr val="000000"/>
-              </a:buClr>
-              <a:buSzPts val="4500"/>
-              <a:buFont typeface="Arial"/>
-              <a:buNone/>
-            </a:pPr>
-            <a:r>
-              <a:rPr lang="es-MX" sz="4500" b="0" i="1" u="none" strike="noStrike" cap="none">
-                <a:solidFill>
-                  <a:srgbClr val="FFFFFF"/>
-                </a:solidFill>
-                <a:latin typeface="Montserrat SemiBold"/>
-                <a:ea typeface="Montserrat SemiBold"/>
-                <a:cs typeface="Montserrat SemiBold"/>
-                <a:sym typeface="Montserrat SemiBold"/>
-              </a:rPr>
-              <a:t>“The next big thing is the one that makes the last big thing usable.”</a:t>
-            </a:r>
-            <a:endParaRPr sz="4500" b="0" i="1" u="none" strike="noStrike" cap="none">
-              <a:solidFill>
-                <a:srgbClr val="FFFFFF"/>
-              </a:solidFill>
-              <a:latin typeface="Montserrat SemiBold"/>
-              <a:ea typeface="Montserrat SemiBold"/>
-              <a:cs typeface="Montserrat SemiBold"/>
-              <a:sym typeface="Montserrat SemiBold"/>
-            </a:endParaRPr>
-          </a:p>
-        </p:txBody>
-      </p:sp>
-      <p:sp>
-        <p:nvSpPr>
-          <p:cNvPr id="102" name="Google Shape;102;g7ed7eb645d_0_749"/>
-          <p:cNvSpPr txBox="1"/>
-          <p:nvPr/>
-        </p:nvSpPr>
-        <p:spPr>
-          <a:xfrm>
-            <a:off x="7561275" y="5255825"/>
-            <a:ext cx="4789500" cy="1282800"/>
-          </a:xfrm>
-          <a:prstGeom prst="rect">
-            <a:avLst/>
-          </a:prstGeom>
-          <a:noFill/>
-          <a:ln>
-            <a:noFill/>
-          </a:ln>
-        </p:spPr>
-        <p:txBody>
-          <a:bodyPr spcFirstLastPara="1" wrap="square" lIns="147725" tIns="147725" rIns="147725" bIns="147725" anchor="ctr" anchorCtr="0">
-            <a:noAutofit/>
-          </a:bodyPr>
-          <a:lstStyle/>
-          <a:p>
-            <a:pPr marL="0" marR="0" lvl="0" indent="0" algn="ctr" rtl="0">
-              <a:lnSpc>
-                <a:spcPct val="100000"/>
-              </a:lnSpc>
-              <a:spcBef>
-                <a:spcPts val="0"/>
-              </a:spcBef>
-              <a:spcAft>
-                <a:spcPts val="0"/>
-              </a:spcAft>
-              <a:buClr>
-                <a:srgbClr val="000000"/>
-              </a:buClr>
-              <a:buSzPts val="3000"/>
-              <a:buFont typeface="Arial"/>
-              <a:buNone/>
-            </a:pPr>
-            <a:r>
-              <a:rPr lang="es-MX" sz="3000" b="0" i="1" u="none" strike="noStrike" cap="none">
-                <a:solidFill>
-                  <a:srgbClr val="FFFFFF"/>
-                </a:solidFill>
-                <a:latin typeface="Montserrat"/>
-                <a:ea typeface="Montserrat"/>
-                <a:cs typeface="Montserrat"/>
-                <a:sym typeface="Montserrat"/>
-              </a:rPr>
-              <a:t>— Blake Ross</a:t>
-            </a:r>
-            <a:endParaRPr sz="3000" b="0" i="1" u="none" strike="noStrike" cap="none">
-              <a:solidFill>
-                <a:srgbClr val="FFFFFF"/>
-              </a:solidFill>
-              <a:latin typeface="Montserrat"/>
-              <a:ea typeface="Montserrat"/>
-              <a:cs typeface="Montserrat"/>
-              <a:sym typeface="Montserrat"/>
-            </a:endParaRPr>
-          </a:p>
-        </p:txBody>
-      </p:sp>
-      <p:pic>
-        <p:nvPicPr>
-          <p:cNvPr id="103" name="Google Shape;103;g7ed7eb645d_0_749"/>
-          <p:cNvPicPr preferRelativeResize="0"/>
-          <p:nvPr/>
-        </p:nvPicPr>
-        <p:blipFill rotWithShape="1">
-          <a:blip r:embed="rId4">
-            <a:alphaModFix/>
-          </a:blip>
-          <a:srcRect/>
-          <a:stretch/>
-        </p:blipFill>
-        <p:spPr>
-          <a:xfrm>
-            <a:off x="1480700" y="6904567"/>
-            <a:ext cx="1430575" cy="126308"/>
-          </a:xfrm>
-          <a:prstGeom prst="rect">
-            <a:avLst/>
-          </a:prstGeom>
-          <a:noFill/>
-          <a:ln>
-            <a:noFill/>
-          </a:ln>
-        </p:spPr>
-      </p:pic>
-      <p:pic>
-        <p:nvPicPr>
-          <p:cNvPr id="104" name="Google Shape;104;g7ed7eb645d_0_749"/>
-          <p:cNvPicPr preferRelativeResize="0"/>
-          <p:nvPr/>
-        </p:nvPicPr>
-        <p:blipFill rotWithShape="1">
-          <a:blip r:embed="rId5">
-            <a:alphaModFix/>
-          </a:blip>
-          <a:srcRect/>
-          <a:stretch/>
-        </p:blipFill>
-        <p:spPr>
-          <a:xfrm>
-            <a:off x="12350777" y="615238"/>
-            <a:ext cx="1620000" cy="644175"/>
-          </a:xfrm>
-          <a:prstGeom prst="rect">
-            <a:avLst/>
-          </a:prstGeom>
-          <a:noFill/>
-          <a:ln>
-            <a:noFill/>
-          </a:ln>
-        </p:spPr>
-      </p:pic>
-    </p:spTree>
-  </p:cSld>
-  <p:clrMapOvr>
-    <a:masterClrMapping/>
-  </p:clrMapOvr>
-</p:sld>
-</file>
-
-<file path=ppt/slides/slide5.xml><?xml version="1.0" encoding="utf-8"?>
-<p:sld xmlns:a="http://schemas.openxmlformats.org/drawingml/2006/main" xmlns:r="http://schemas.openxmlformats.org/officeDocument/2006/relationships" xmlns:p="http://schemas.openxmlformats.org/presentationml/2006/main">
-  <p:cSld>
     <p:spTree>
       <p:nvGrpSpPr>
         <p:cNvPr id="1" name="Shape 108"/>
@@ -12407,7 +12513,7 @@
                 <a:cs typeface="Montserrat"/>
                 <a:sym typeface="Montserrat"/>
               </a:rPr>
-              <a:t>Antecedentes del problema</a:t>
+              <a:t>Definición del problema</a:t>
             </a:r>
             <a:endParaRPr sz="4000" b="0" i="0" u="none" strike="noStrike" cap="none" dirty="0">
               <a:solidFill>
@@ -12574,7 +12680,757 @@
 </p:sld>
 </file>
 
+<file path=ppt/slides/slide5.xml><?xml version="1.0" encoding="utf-8"?>
+<p:sld xmlns:a="http://schemas.openxmlformats.org/drawingml/2006/main" xmlns:r="http://schemas.openxmlformats.org/officeDocument/2006/relationships" xmlns:p="http://schemas.openxmlformats.org/presentationml/2006/main">
+  <p:cSld>
+    <p:spTree>
+      <p:nvGrpSpPr>
+        <p:cNvPr id="1" name="Shape 156"/>
+        <p:cNvGrpSpPr/>
+        <p:nvPr/>
+      </p:nvGrpSpPr>
+      <p:grpSpPr>
+        <a:xfrm>
+          <a:off x="0" y="0"/>
+          <a:ext cx="0" cy="0"/>
+          <a:chOff x="0" y="0"/>
+          <a:chExt cx="0" cy="0"/>
+        </a:xfrm>
+      </p:grpSpPr>
+      <p:sp>
+        <p:nvSpPr>
+          <p:cNvPr id="158" name="Google Shape;158;g7ed7eb645d_0_804"/>
+          <p:cNvSpPr txBox="1"/>
+          <p:nvPr/>
+        </p:nvSpPr>
+        <p:spPr>
+          <a:xfrm>
+            <a:off x="5967662" y="3734257"/>
+            <a:ext cx="8645200" cy="1300200"/>
+          </a:xfrm>
+          <a:prstGeom prst="rect">
+            <a:avLst/>
+          </a:prstGeom>
+          <a:noFill/>
+          <a:ln>
+            <a:noFill/>
+          </a:ln>
+        </p:spPr>
+        <p:txBody>
+          <a:bodyPr spcFirstLastPara="1" wrap="square" lIns="147725" tIns="147725" rIns="147725" bIns="147725" anchor="ctr" anchorCtr="0">
+            <a:noAutofit/>
+          </a:bodyPr>
+          <a:lstStyle/>
+          <a:p>
+            <a:pPr marL="0" marR="0" lvl="0" indent="0" algn="ctr" rtl="0">
+              <a:lnSpc>
+                <a:spcPct val="100000"/>
+              </a:lnSpc>
+              <a:spcBef>
+                <a:spcPts val="0"/>
+              </a:spcBef>
+              <a:spcAft>
+                <a:spcPts val="0"/>
+              </a:spcAft>
+              <a:buClr>
+                <a:srgbClr val="000000"/>
+              </a:buClr>
+              <a:buSzPts val="7800"/>
+              <a:buFont typeface="Arial"/>
+              <a:buNone/>
+            </a:pPr>
+            <a:r>
+              <a:rPr lang="es-MX" sz="7800" b="1" i="0" u="none" strike="noStrike" cap="none" dirty="0">
+                <a:solidFill>
+                  <a:schemeClr val="lt1"/>
+                </a:solidFill>
+                <a:latin typeface="Montserrat"/>
+                <a:ea typeface="Montserrat"/>
+                <a:cs typeface="Montserrat"/>
+                <a:sym typeface="Montserrat"/>
+              </a:rPr>
+              <a:t>Imagen</a:t>
+            </a:r>
+            <a:endParaRPr sz="7800" b="1" i="0" u="none" strike="noStrike" cap="none" dirty="0">
+              <a:solidFill>
+                <a:schemeClr val="lt1"/>
+              </a:solidFill>
+              <a:latin typeface="Montserrat"/>
+              <a:ea typeface="Montserrat"/>
+              <a:cs typeface="Montserrat"/>
+              <a:sym typeface="Montserrat"/>
+            </a:endParaRPr>
+          </a:p>
+        </p:txBody>
+      </p:sp>
+      <p:sp>
+        <p:nvSpPr>
+          <p:cNvPr id="159" name="Google Shape;159;g7ed7eb645d_0_804"/>
+          <p:cNvSpPr txBox="1"/>
+          <p:nvPr/>
+        </p:nvSpPr>
+        <p:spPr>
+          <a:xfrm>
+            <a:off x="509026" y="414450"/>
+            <a:ext cx="9218400" cy="716700"/>
+          </a:xfrm>
+          <a:prstGeom prst="rect">
+            <a:avLst/>
+          </a:prstGeom>
+          <a:noFill/>
+          <a:ln>
+            <a:noFill/>
+          </a:ln>
+        </p:spPr>
+        <p:txBody>
+          <a:bodyPr spcFirstLastPara="1" wrap="square" lIns="147725" tIns="147725" rIns="147725" bIns="147725" anchor="ctr" anchorCtr="0">
+            <a:noAutofit/>
+          </a:bodyPr>
+          <a:lstStyle/>
+          <a:p>
+            <a:pPr marL="0" marR="0" lvl="0" indent="0" algn="l" rtl="0">
+              <a:lnSpc>
+                <a:spcPct val="100000"/>
+              </a:lnSpc>
+              <a:spcBef>
+                <a:spcPts val="0"/>
+              </a:spcBef>
+              <a:spcAft>
+                <a:spcPts val="0"/>
+              </a:spcAft>
+              <a:buClr>
+                <a:srgbClr val="000000"/>
+              </a:buClr>
+              <a:buSzPts val="4000"/>
+              <a:buFont typeface="Arial"/>
+              <a:buNone/>
+            </a:pPr>
+            <a:r>
+              <a:rPr lang="es-MX" sz="4000" b="1" i="0" u="none" strike="noStrike" cap="none" dirty="0" err="1">
+                <a:solidFill>
+                  <a:srgbClr val="16181C"/>
+                </a:solidFill>
+                <a:latin typeface="Montserrat"/>
+                <a:ea typeface="Montserrat"/>
+                <a:cs typeface="Montserrat"/>
+                <a:sym typeface="Montserrat"/>
+              </a:rPr>
+              <a:t>Origenes</a:t>
+            </a:r>
+            <a:r>
+              <a:rPr lang="es-MX" sz="4000" b="1" i="0" u="none" strike="noStrike" cap="none" dirty="0">
+                <a:solidFill>
+                  <a:srgbClr val="16181C"/>
+                </a:solidFill>
+                <a:latin typeface="Montserrat"/>
+                <a:ea typeface="Montserrat"/>
+                <a:cs typeface="Montserrat"/>
+                <a:sym typeface="Montserrat"/>
+              </a:rPr>
+              <a:t> de datos</a:t>
+            </a:r>
+            <a:endParaRPr sz="4000" b="0" i="0" u="none" strike="noStrike" cap="none" dirty="0">
+              <a:solidFill>
+                <a:srgbClr val="16181C"/>
+              </a:solidFill>
+              <a:latin typeface="Montserrat"/>
+              <a:ea typeface="Montserrat"/>
+              <a:cs typeface="Montserrat"/>
+              <a:sym typeface="Montserrat"/>
+            </a:endParaRPr>
+          </a:p>
+        </p:txBody>
+      </p:sp>
+      <p:sp>
+        <p:nvSpPr>
+          <p:cNvPr id="160" name="Google Shape;160;g7ed7eb645d_0_804"/>
+          <p:cNvSpPr txBox="1"/>
+          <p:nvPr/>
+        </p:nvSpPr>
+        <p:spPr>
+          <a:xfrm>
+            <a:off x="509026" y="2194175"/>
+            <a:ext cx="4977374" cy="5236800"/>
+          </a:xfrm>
+          <a:prstGeom prst="rect">
+            <a:avLst/>
+          </a:prstGeom>
+          <a:noFill/>
+          <a:ln>
+            <a:noFill/>
+          </a:ln>
+        </p:spPr>
+        <p:txBody>
+          <a:bodyPr spcFirstLastPara="1" wrap="square" lIns="147725" tIns="147725" rIns="147725" bIns="147725" anchor="t" anchorCtr="0">
+            <a:noAutofit/>
+          </a:bodyPr>
+          <a:lstStyle/>
+          <a:p>
+            <a:pPr marL="0" marR="0" lvl="0" indent="0" algn="l" rtl="0">
+              <a:lnSpc>
+                <a:spcPct val="100000"/>
+              </a:lnSpc>
+              <a:spcBef>
+                <a:spcPts val="0"/>
+              </a:spcBef>
+              <a:spcAft>
+                <a:spcPts val="0"/>
+              </a:spcAft>
+              <a:buClr>
+                <a:srgbClr val="000000"/>
+              </a:buClr>
+              <a:buSzPts val="2600"/>
+              <a:buFont typeface="Arial"/>
+              <a:buNone/>
+            </a:pPr>
+            <a:r>
+              <a:rPr lang="es-PA" sz="2600" b="0" i="0" u="none" strike="noStrike" cap="none" dirty="0">
+                <a:solidFill>
+                  <a:srgbClr val="2B303C"/>
+                </a:solidFill>
+                <a:latin typeface="Montserrat"/>
+                <a:ea typeface="Montserrat"/>
+                <a:cs typeface="Montserrat"/>
+                <a:sym typeface="Montserrat"/>
+              </a:rPr>
+              <a:t>Los datos son obtenidos de data de puntos de ventas y de productos que se manejan en </a:t>
+            </a:r>
+            <a:r>
+              <a:rPr lang="es-PA" sz="2600" b="0" i="0" u="none" strike="noStrike" cap="none" dirty="0" err="1">
+                <a:solidFill>
+                  <a:srgbClr val="2B303C"/>
+                </a:solidFill>
+                <a:latin typeface="Montserrat"/>
+                <a:ea typeface="Montserrat"/>
+                <a:cs typeface="Montserrat"/>
+                <a:sym typeface="Montserrat"/>
+              </a:rPr>
+              <a:t>sql</a:t>
+            </a:r>
+            <a:r>
+              <a:rPr lang="es-PA" sz="2600" b="0" i="0" u="none" strike="noStrike" cap="none" dirty="0">
+                <a:solidFill>
+                  <a:srgbClr val="2B303C"/>
+                </a:solidFill>
+                <a:latin typeface="Montserrat"/>
+                <a:ea typeface="Montserrat"/>
+                <a:cs typeface="Montserrat"/>
+                <a:sym typeface="Montserrat"/>
+              </a:rPr>
+              <a:t>.</a:t>
+            </a:r>
+          </a:p>
+          <a:p>
+            <a:pPr marL="0" marR="0" lvl="0" indent="0" algn="l" rtl="0">
+              <a:lnSpc>
+                <a:spcPct val="100000"/>
+              </a:lnSpc>
+              <a:spcBef>
+                <a:spcPts val="0"/>
+              </a:spcBef>
+              <a:spcAft>
+                <a:spcPts val="0"/>
+              </a:spcAft>
+              <a:buClr>
+                <a:srgbClr val="000000"/>
+              </a:buClr>
+              <a:buSzPts val="2600"/>
+              <a:buFont typeface="Arial"/>
+              <a:buNone/>
+            </a:pPr>
+            <a:r>
+              <a:rPr lang="es-PA" sz="2600" dirty="0">
+                <a:solidFill>
+                  <a:srgbClr val="2B303C"/>
+                </a:solidFill>
+                <a:latin typeface="Montserrat"/>
+                <a:ea typeface="Montserrat"/>
+                <a:cs typeface="Montserrat"/>
+                <a:sym typeface="Montserrat"/>
+              </a:rPr>
+              <a:t>La data transaccional se procesa a través de procesamiento en </a:t>
+            </a:r>
+            <a:r>
+              <a:rPr lang="es-PA" sz="2600" dirty="0" err="1">
+                <a:solidFill>
+                  <a:srgbClr val="2B303C"/>
+                </a:solidFill>
+                <a:latin typeface="Montserrat"/>
+                <a:ea typeface="Montserrat"/>
+                <a:cs typeface="Montserrat"/>
+                <a:sym typeface="Montserrat"/>
+              </a:rPr>
+              <a:t>Spark</a:t>
+            </a:r>
+            <a:r>
+              <a:rPr lang="es-PA" sz="2600" dirty="0">
+                <a:solidFill>
+                  <a:srgbClr val="2B303C"/>
+                </a:solidFill>
+                <a:latin typeface="Montserrat"/>
+                <a:ea typeface="Montserrat"/>
+                <a:cs typeface="Montserrat"/>
+                <a:sym typeface="Montserrat"/>
+              </a:rPr>
+              <a:t> pero se requiere reorganizar los datos.</a:t>
+            </a:r>
+            <a:endParaRPr sz="2600" b="0" i="0" u="none" strike="noStrike" cap="none" dirty="0">
+              <a:solidFill>
+                <a:srgbClr val="2B303C"/>
+              </a:solidFill>
+              <a:latin typeface="Montserrat"/>
+              <a:ea typeface="Montserrat"/>
+              <a:cs typeface="Montserrat"/>
+              <a:sym typeface="Montserrat"/>
+            </a:endParaRPr>
+          </a:p>
+        </p:txBody>
+      </p:sp>
+      <p:cxnSp>
+        <p:nvCxnSpPr>
+          <p:cNvPr id="161" name="Google Shape;161;g7ed7eb645d_0_804"/>
+          <p:cNvCxnSpPr/>
+          <p:nvPr/>
+        </p:nvCxnSpPr>
+        <p:spPr>
+          <a:xfrm>
+            <a:off x="14001733" y="0"/>
+            <a:ext cx="0" cy="3469942"/>
+          </a:xfrm>
+          <a:prstGeom prst="straightConnector1">
+            <a:avLst/>
+          </a:prstGeom>
+          <a:noFill/>
+          <a:ln w="9525" cap="flat" cmpd="sng">
+            <a:solidFill>
+              <a:srgbClr val="4B22F4"/>
+            </a:solidFill>
+            <a:prstDash val="solid"/>
+            <a:round/>
+            <a:headEnd type="none" w="sm" len="sm"/>
+            <a:tailEnd type="triangle" w="med" len="med"/>
+          </a:ln>
+        </p:spPr>
+      </p:cxnSp>
+      <p:pic>
+        <p:nvPicPr>
+          <p:cNvPr id="162" name="Google Shape;162;g7ed7eb645d_0_804"/>
+          <p:cNvPicPr preferRelativeResize="0"/>
+          <p:nvPr/>
+        </p:nvPicPr>
+        <p:blipFill rotWithShape="1">
+          <a:blip r:embed="rId3">
+            <a:alphaModFix/>
+          </a:blip>
+          <a:srcRect/>
+          <a:stretch/>
+        </p:blipFill>
+        <p:spPr>
+          <a:xfrm>
+            <a:off x="2877127" y="6078699"/>
+            <a:ext cx="3829050" cy="952500"/>
+          </a:xfrm>
+          <a:prstGeom prst="rect">
+            <a:avLst/>
+          </a:prstGeom>
+          <a:noFill/>
+          <a:ln>
+            <a:noFill/>
+          </a:ln>
+        </p:spPr>
+      </p:pic>
+      <p:pic>
+        <p:nvPicPr>
+          <p:cNvPr id="1026" name="Picture 2" descr="Qué es SQL Server Localdb, cómo instalarlo, usarlo y actualizarlo |  JASoft.org">
+            <a:extLst>
+              <a:ext uri="{FF2B5EF4-FFF2-40B4-BE49-F238E27FC236}">
+                <a16:creationId xmlns:a16="http://schemas.microsoft.com/office/drawing/2014/main" id="{2D5C6944-46AE-49F3-9B6F-C5536A628929}"/>
+              </a:ext>
+            </a:extLst>
+          </p:cNvPr>
+          <p:cNvPicPr>
+            <a:picLocks noChangeAspect="1" noChangeArrowheads="1"/>
+          </p:cNvPicPr>
+          <p:nvPr/>
+        </p:nvPicPr>
+        <p:blipFill>
+          <a:blip r:embed="rId4">
+            <a:extLst>
+              <a:ext uri="{28A0092B-C50C-407E-A947-70E740481C1C}">
+                <a14:useLocalDpi xmlns:a14="http://schemas.microsoft.com/office/drawing/2010/main" val="0"/>
+              </a:ext>
+            </a:extLst>
+          </a:blip>
+          <a:srcRect/>
+          <a:stretch>
+            <a:fillRect/>
+          </a:stretch>
+        </p:blipFill>
+        <p:spPr bwMode="auto">
+          <a:xfrm>
+            <a:off x="7904843" y="2341891"/>
+            <a:ext cx="2143125" cy="2143125"/>
+          </a:xfrm>
+          <a:prstGeom prst="rect">
+            <a:avLst/>
+          </a:prstGeom>
+          <a:noFill/>
+          <a:extLst>
+            <a:ext uri="{909E8E84-426E-40DD-AFC4-6F175D3DCCD1}">
+              <a14:hiddenFill xmlns:a14="http://schemas.microsoft.com/office/drawing/2010/main">
+                <a:solidFill>
+                  <a:srgbClr val="FFFFFF"/>
+                </a:solidFill>
+              </a14:hiddenFill>
+            </a:ext>
+          </a:extLst>
+        </p:spPr>
+      </p:pic>
+      <p:pic>
+        <p:nvPicPr>
+          <p:cNvPr id="1028" name="Picture 4" descr="Emanuel Goette, alias Crespo: DataFrame en Spark SQL">
+            <a:extLst>
+              <a:ext uri="{FF2B5EF4-FFF2-40B4-BE49-F238E27FC236}">
+                <a16:creationId xmlns:a16="http://schemas.microsoft.com/office/drawing/2014/main" id="{1DA1A336-AC3A-473E-B32C-1C446FE0D873}"/>
+              </a:ext>
+            </a:extLst>
+          </p:cNvPr>
+          <p:cNvPicPr>
+            <a:picLocks noChangeAspect="1" noChangeArrowheads="1"/>
+          </p:cNvPicPr>
+          <p:nvPr/>
+        </p:nvPicPr>
+        <p:blipFill>
+          <a:blip r:embed="rId5">
+            <a:extLst>
+              <a:ext uri="{28A0092B-C50C-407E-A947-70E740481C1C}">
+                <a14:useLocalDpi xmlns:a14="http://schemas.microsoft.com/office/drawing/2010/main" val="0"/>
+              </a:ext>
+            </a:extLst>
+          </a:blip>
+          <a:srcRect/>
+          <a:stretch>
+            <a:fillRect/>
+          </a:stretch>
+        </p:blipFill>
+        <p:spPr bwMode="auto">
+          <a:xfrm>
+            <a:off x="10047968" y="4572457"/>
+            <a:ext cx="3505200" cy="1304925"/>
+          </a:xfrm>
+          <a:prstGeom prst="rect">
+            <a:avLst/>
+          </a:prstGeom>
+          <a:noFill/>
+          <a:extLst>
+            <a:ext uri="{909E8E84-426E-40DD-AFC4-6F175D3DCCD1}">
+              <a14:hiddenFill xmlns:a14="http://schemas.microsoft.com/office/drawing/2010/main">
+                <a:solidFill>
+                  <a:srgbClr val="FFFFFF"/>
+                </a:solidFill>
+              </a14:hiddenFill>
+            </a:ext>
+          </a:extLst>
+        </p:spPr>
+      </p:pic>
+    </p:spTree>
+  </p:cSld>
+  <p:clrMapOvr>
+    <a:masterClrMapping/>
+  </p:clrMapOvr>
+</p:sld>
+</file>
+
 <file path=ppt/slides/slide6.xml><?xml version="1.0" encoding="utf-8"?>
+<p:sld xmlns:a="http://schemas.openxmlformats.org/drawingml/2006/main" xmlns:r="http://schemas.openxmlformats.org/officeDocument/2006/relationships" xmlns:p="http://schemas.openxmlformats.org/presentationml/2006/main">
+  <p:cSld>
+    <p:spTree>
+      <p:nvGrpSpPr>
+        <p:cNvPr id="1" name="Shape 156"/>
+        <p:cNvGrpSpPr/>
+        <p:nvPr/>
+      </p:nvGrpSpPr>
+      <p:grpSpPr>
+        <a:xfrm>
+          <a:off x="0" y="0"/>
+          <a:ext cx="0" cy="0"/>
+          <a:chOff x="0" y="0"/>
+          <a:chExt cx="0" cy="0"/>
+        </a:xfrm>
+      </p:grpSpPr>
+      <p:sp>
+        <p:nvSpPr>
+          <p:cNvPr id="159" name="Google Shape;159;g7ed7eb645d_0_804"/>
+          <p:cNvSpPr txBox="1"/>
+          <p:nvPr/>
+        </p:nvSpPr>
+        <p:spPr>
+          <a:xfrm>
+            <a:off x="525667" y="890426"/>
+            <a:ext cx="9218400" cy="716700"/>
+          </a:xfrm>
+          <a:prstGeom prst="rect">
+            <a:avLst/>
+          </a:prstGeom>
+          <a:noFill/>
+          <a:ln>
+            <a:noFill/>
+          </a:ln>
+        </p:spPr>
+        <p:txBody>
+          <a:bodyPr spcFirstLastPara="1" wrap="square" lIns="147725" tIns="147725" rIns="147725" bIns="147725" anchor="ctr" anchorCtr="0">
+            <a:noAutofit/>
+          </a:bodyPr>
+          <a:lstStyle/>
+          <a:p>
+            <a:r>
+              <a:rPr lang="es-MX" sz="4000" b="1" dirty="0">
+                <a:solidFill>
+                  <a:srgbClr val="16181C"/>
+                </a:solidFill>
+                <a:latin typeface="Montserrat"/>
+                <a:sym typeface="Montserrat"/>
+              </a:rPr>
+              <a:t>Obtención</a:t>
+            </a:r>
+            <a:r>
+              <a:rPr lang="es-MX" sz="4000" b="1" i="0" u="none" strike="noStrike" cap="none" dirty="0">
+                <a:solidFill>
+                  <a:srgbClr val="16181C"/>
+                </a:solidFill>
+                <a:latin typeface="Montserrat"/>
+                <a:ea typeface="Montserrat"/>
+                <a:cs typeface="Montserrat"/>
+                <a:sym typeface="Montserrat"/>
+              </a:rPr>
+              <a:t> de datos</a:t>
+            </a:r>
+            <a:endParaRPr lang="es-MX" sz="4000" b="0" i="0" u="none" strike="noStrike" cap="none" dirty="0">
+              <a:solidFill>
+                <a:srgbClr val="16181C"/>
+              </a:solidFill>
+              <a:latin typeface="Montserrat"/>
+              <a:ea typeface="Montserrat"/>
+              <a:cs typeface="Montserrat"/>
+              <a:sym typeface="Montserrat"/>
+            </a:endParaRPr>
+          </a:p>
+          <a:p>
+            <a:pPr algn="l"/>
+            <a:endParaRPr lang="es-PA" sz="4800" b="0" i="0" dirty="0">
+              <a:solidFill>
+                <a:srgbClr val="1D1C1D"/>
+              </a:solidFill>
+              <a:effectLst/>
+              <a:latin typeface="Slack-Lato"/>
+            </a:endParaRPr>
+          </a:p>
+        </p:txBody>
+      </p:sp>
+      <p:sp>
+        <p:nvSpPr>
+          <p:cNvPr id="160" name="Google Shape;160;g7ed7eb645d_0_804"/>
+          <p:cNvSpPr txBox="1"/>
+          <p:nvPr/>
+        </p:nvSpPr>
+        <p:spPr>
+          <a:xfrm>
+            <a:off x="509026" y="2194175"/>
+            <a:ext cx="4977374" cy="5236800"/>
+          </a:xfrm>
+          <a:prstGeom prst="rect">
+            <a:avLst/>
+          </a:prstGeom>
+          <a:noFill/>
+          <a:ln>
+            <a:noFill/>
+          </a:ln>
+        </p:spPr>
+        <p:txBody>
+          <a:bodyPr spcFirstLastPara="1" wrap="square" lIns="147725" tIns="147725" rIns="147725" bIns="147725" anchor="t" anchorCtr="0">
+            <a:noAutofit/>
+          </a:bodyPr>
+          <a:lstStyle/>
+          <a:p>
+            <a:pPr marL="0" marR="0" lvl="0" indent="0" algn="l" rtl="0">
+              <a:lnSpc>
+                <a:spcPct val="100000"/>
+              </a:lnSpc>
+              <a:spcBef>
+                <a:spcPts val="0"/>
+              </a:spcBef>
+              <a:spcAft>
+                <a:spcPts val="0"/>
+              </a:spcAft>
+              <a:buClr>
+                <a:srgbClr val="000000"/>
+              </a:buClr>
+              <a:buSzPts val="2600"/>
+              <a:buFont typeface="Arial"/>
+              <a:buNone/>
+            </a:pPr>
+            <a:r>
+              <a:rPr lang="es-PA" sz="2600" b="0" i="0" u="none" strike="noStrike" cap="none" dirty="0">
+                <a:solidFill>
+                  <a:srgbClr val="2B303C"/>
+                </a:solidFill>
+                <a:latin typeface="Montserrat"/>
+                <a:ea typeface="Montserrat"/>
+                <a:cs typeface="Montserrat"/>
+                <a:sym typeface="Montserrat"/>
+              </a:rPr>
+              <a:t>Para este solución se tienen unos archivos en formatos </a:t>
+            </a:r>
+            <a:r>
+              <a:rPr lang="es-PA" sz="2600" b="0" i="0" u="none" strike="noStrike" cap="none" dirty="0" err="1">
+                <a:solidFill>
+                  <a:srgbClr val="2B303C"/>
+                </a:solidFill>
+                <a:latin typeface="Montserrat"/>
+                <a:ea typeface="Montserrat"/>
+                <a:cs typeface="Montserrat"/>
+                <a:sym typeface="Montserrat"/>
+              </a:rPr>
+              <a:t>csv</a:t>
+            </a:r>
+            <a:r>
+              <a:rPr lang="es-PA" sz="2600" b="0" i="0" u="none" strike="noStrike" cap="none" dirty="0">
+                <a:solidFill>
+                  <a:srgbClr val="2B303C"/>
+                </a:solidFill>
+                <a:latin typeface="Montserrat"/>
+                <a:ea typeface="Montserrat"/>
+                <a:cs typeface="Montserrat"/>
+                <a:sym typeface="Montserrat"/>
+              </a:rPr>
+              <a:t> que son generados por exportación de su orígenes en su etapa raw.</a:t>
+            </a:r>
+            <a:endParaRPr sz="2600" b="0" i="0" u="none" strike="noStrike" cap="none" dirty="0">
+              <a:solidFill>
+                <a:srgbClr val="2B303C"/>
+              </a:solidFill>
+              <a:latin typeface="Montserrat"/>
+              <a:ea typeface="Montserrat"/>
+              <a:cs typeface="Montserrat"/>
+              <a:sym typeface="Montserrat"/>
+            </a:endParaRPr>
+          </a:p>
+        </p:txBody>
+      </p:sp>
+      <p:cxnSp>
+        <p:nvCxnSpPr>
+          <p:cNvPr id="161" name="Google Shape;161;g7ed7eb645d_0_804"/>
+          <p:cNvCxnSpPr/>
+          <p:nvPr/>
+        </p:nvCxnSpPr>
+        <p:spPr>
+          <a:xfrm>
+            <a:off x="14001733" y="0"/>
+            <a:ext cx="0" cy="3469942"/>
+          </a:xfrm>
+          <a:prstGeom prst="straightConnector1">
+            <a:avLst/>
+          </a:prstGeom>
+          <a:noFill/>
+          <a:ln w="9525" cap="flat" cmpd="sng">
+            <a:solidFill>
+              <a:srgbClr val="4B22F4"/>
+            </a:solidFill>
+            <a:prstDash val="solid"/>
+            <a:round/>
+            <a:headEnd type="none" w="sm" len="sm"/>
+            <a:tailEnd type="triangle" w="med" len="med"/>
+          </a:ln>
+        </p:spPr>
+      </p:cxnSp>
+      <p:pic>
+        <p:nvPicPr>
+          <p:cNvPr id="162" name="Google Shape;162;g7ed7eb645d_0_804"/>
+          <p:cNvPicPr preferRelativeResize="0"/>
+          <p:nvPr/>
+        </p:nvPicPr>
+        <p:blipFill rotWithShape="1">
+          <a:blip r:embed="rId3">
+            <a:alphaModFix/>
+          </a:blip>
+          <a:srcRect/>
+          <a:stretch/>
+        </p:blipFill>
+        <p:spPr>
+          <a:xfrm>
+            <a:off x="2877127" y="6078699"/>
+            <a:ext cx="3829050" cy="952500"/>
+          </a:xfrm>
+          <a:prstGeom prst="rect">
+            <a:avLst/>
+          </a:prstGeom>
+          <a:noFill/>
+          <a:ln>
+            <a:noFill/>
+          </a:ln>
+        </p:spPr>
+      </p:pic>
+      <p:pic>
+        <p:nvPicPr>
+          <p:cNvPr id="2050" name="Picture 2" descr="CSV Extensión de archivo 】¿Qué es .Csv y cómo abrirlos? ▷ 2022">
+            <a:extLst>
+              <a:ext uri="{FF2B5EF4-FFF2-40B4-BE49-F238E27FC236}">
+                <a16:creationId xmlns:a16="http://schemas.microsoft.com/office/drawing/2014/main" id="{AABC1FDC-1EB7-40FB-9FE5-F2262A95F422}"/>
+              </a:ext>
+            </a:extLst>
+          </p:cNvPr>
+          <p:cNvPicPr>
+            <a:picLocks noChangeAspect="1" noChangeArrowheads="1"/>
+          </p:cNvPicPr>
+          <p:nvPr/>
+        </p:nvPicPr>
+        <p:blipFill>
+          <a:blip r:embed="rId4">
+            <a:extLst>
+              <a:ext uri="{28A0092B-C50C-407E-A947-70E740481C1C}">
+                <a14:useLocalDpi xmlns:a14="http://schemas.microsoft.com/office/drawing/2010/main" val="0"/>
+              </a:ext>
+            </a:extLst>
+          </a:blip>
+          <a:srcRect/>
+          <a:stretch>
+            <a:fillRect/>
+          </a:stretch>
+        </p:blipFill>
+        <p:spPr bwMode="auto">
+          <a:xfrm>
+            <a:off x="8530772" y="2194175"/>
+            <a:ext cx="1914525" cy="2390775"/>
+          </a:xfrm>
+          <a:prstGeom prst="rect">
+            <a:avLst/>
+          </a:prstGeom>
+          <a:noFill/>
+          <a:extLst>
+            <a:ext uri="{909E8E84-426E-40DD-AFC4-6F175D3DCCD1}">
+              <a14:hiddenFill xmlns:a14="http://schemas.microsoft.com/office/drawing/2010/main">
+                <a:solidFill>
+                  <a:srgbClr val="FFFFFF"/>
+                </a:solidFill>
+              </a14:hiddenFill>
+            </a:ext>
+          </a:extLst>
+        </p:spPr>
+      </p:pic>
+    </p:spTree>
+    <p:extLst>
+      <p:ext uri="{BB962C8B-B14F-4D97-AF65-F5344CB8AC3E}">
+        <p14:creationId xmlns:p14="http://schemas.microsoft.com/office/powerpoint/2010/main" val="3944554453"/>
+      </p:ext>
+    </p:extLst>
+  </p:cSld>
+  <p:clrMapOvr>
+    <a:masterClrMapping/>
+  </p:clrMapOvr>
+</p:sld>
+</file>
+
+<file path=ppt/slides/slide7.xml><?xml version="1.0" encoding="utf-8"?>
 <p:sld xmlns:a="http://schemas.openxmlformats.org/drawingml/2006/main" xmlns:r="http://schemas.openxmlformats.org/officeDocument/2006/relationships" xmlns:p="http://schemas.openxmlformats.org/presentationml/2006/main">
   <p:cSld>
     <p:bg>
@@ -12874,7 +13730,7 @@
 </p:sld>
 </file>
 
-<file path=ppt/slides/slide7.xml><?xml version="1.0" encoding="utf-8"?>
+<file path=ppt/slides/slide8.xml><?xml version="1.0" encoding="utf-8"?>
 <p:sld xmlns:a="http://schemas.openxmlformats.org/drawingml/2006/main" xmlns:r="http://schemas.openxmlformats.org/officeDocument/2006/relationships" xmlns:p="http://schemas.openxmlformats.org/presentationml/2006/main">
   <p:cSld>
     <p:bg>
@@ -13180,7 +14036,7 @@
 </p:sld>
 </file>
 
-<file path=ppt/slides/slide8.xml><?xml version="1.0" encoding="utf-8"?>
+<file path=ppt/slides/slide9.xml><?xml version="1.0" encoding="utf-8"?>
 <p:sld xmlns:a="http://schemas.openxmlformats.org/drawingml/2006/main" xmlns:r="http://schemas.openxmlformats.org/officeDocument/2006/relationships" xmlns:p="http://schemas.openxmlformats.org/presentationml/2006/main">
   <p:cSld>
     <p:spTree>
@@ -13406,30 +14262,6 @@
                 <a:cs typeface="Montserrat"/>
                 <a:sym typeface="Montserrat SemiBold"/>
               </a:rPr>
-              <a:t>Spark</a:t>
-            </a:r>
-            <a:r>
-              <a:rPr lang="es-PA" sz="2600" dirty="0">
-                <a:solidFill>
-                  <a:srgbClr val="2B303C"/>
-                </a:solidFill>
-                <a:latin typeface="Montserrat SemiBold"/>
-                <a:ea typeface="Montserrat"/>
-                <a:cs typeface="Montserrat"/>
-                <a:sym typeface="Montserrat SemiBold"/>
-              </a:rPr>
-              <a:t> en </a:t>
-            </a:r>
-            <a:r>
-              <a:rPr lang="es-PA" sz="2600" dirty="0" err="1">
-                <a:solidFill>
-                  <a:srgbClr val="2B303C"/>
-                </a:solidFill>
-                <a:latin typeface="Montserrat SemiBold"/>
-                <a:ea typeface="Montserrat"/>
-                <a:cs typeface="Montserrat"/>
-                <a:sym typeface="Montserrat SemiBold"/>
-              </a:rPr>
               <a:t>jupyter-lab</a:t>
             </a:r>
             <a:r>
@@ -13443,6 +14275,37 @@
                 <a:sym typeface="Montserrat SemiBold"/>
               </a:rPr>
               <a:t>, una gran cantidad de datos, que provienen a través de los catálogos y de la data transaccional que generan cada supermercado.</a:t>
+            </a:r>
+          </a:p>
+          <a:p>
+            <a:pPr marL="0" marR="0" lvl="0" indent="0" algn="l" rtl="0">
+              <a:lnSpc>
+                <a:spcPct val="100000"/>
+              </a:lnSpc>
+              <a:spcBef>
+                <a:spcPts val="0"/>
+              </a:spcBef>
+              <a:spcAft>
+                <a:spcPts val="0"/>
+              </a:spcAft>
+              <a:buClr>
+                <a:srgbClr val="000000"/>
+              </a:buClr>
+              <a:buSzPts val="2600"/>
+              <a:buFont typeface="Arial"/>
+              <a:buNone/>
+            </a:pPr>
+            <a:r>
+              <a:rPr lang="es-PA" sz="2600" b="0" i="0" u="none" strike="noStrike" cap="none" dirty="0">
+                <a:solidFill>
+                  <a:srgbClr val="2B303C"/>
+                </a:solidFill>
+                <a:latin typeface="Montserrat SemiBold"/>
+                <a:ea typeface="Montserrat"/>
+                <a:cs typeface="Montserrat"/>
+                <a:sym typeface="Montserrat SemiBold"/>
+              </a:rPr>
+              <a:t>Estableciendo un modelo de procesamiento para que de esta manera se pueda manejar un data de manera diaria</a:t>
             </a:r>
             <a:endParaRPr sz="2600" b="0" i="0" u="none" strike="noStrike" cap="none" dirty="0">
               <a:solidFill>
@@ -13578,10 +14441,10 @@
       </p:pic>
       <p:pic>
         <p:nvPicPr>
-          <p:cNvPr id="2050" name="Picture 2" descr="Apache Spark - Wikipedia">
+          <p:cNvPr id="2052" name="Picture 4" descr="Todo lo que necesitas para aprender PYTHON ya 🔥">
             <a:extLst>
               <a:ext uri="{FF2B5EF4-FFF2-40B4-BE49-F238E27FC236}">
-                <a16:creationId xmlns:a16="http://schemas.microsoft.com/office/drawing/2014/main" id="{2AF04A9B-8C25-45C1-811F-7DF5428D0CC2}"/>
+                <a16:creationId xmlns:a16="http://schemas.microsoft.com/office/drawing/2014/main" id="{B8132D1D-002D-4D3D-BF77-633F21B3AFC4}"/>
               </a:ext>
             </a:extLst>
           </p:cNvPr>
@@ -13605,8 +14468,8 @@
         </p:blipFill>
         <p:spPr bwMode="auto">
           <a:xfrm>
-            <a:off x="1087250" y="1661800"/>
-            <a:ext cx="2971800" cy="1543050"/>
+            <a:off x="71795" y="1938739"/>
+            <a:ext cx="2705100" cy="1685925"/>
           </a:xfrm>
           <a:prstGeom prst="rect">
             <a:avLst/>
@@ -13625,10 +14488,10 @@
       </p:pic>
       <p:pic>
         <p:nvPicPr>
-          <p:cNvPr id="2052" name="Picture 4" descr="Todo lo que necesitas para aprender PYTHON ya 🔥">
+          <p:cNvPr id="2054" name="Picture 6" descr="pandas (software) - Wikipedia">
             <a:extLst>
               <a:ext uri="{FF2B5EF4-FFF2-40B4-BE49-F238E27FC236}">
-                <a16:creationId xmlns:a16="http://schemas.microsoft.com/office/drawing/2014/main" id="{B8132D1D-002D-4D3D-BF77-633F21B3AFC4}"/>
+                <a16:creationId xmlns:a16="http://schemas.microsoft.com/office/drawing/2014/main" id="{AA99AE6B-833D-4475-AC09-D6E1BAB37510}"/>
               </a:ext>
             </a:extLst>
           </p:cNvPr>
@@ -13652,8 +14515,8 @@
         </p:blipFill>
         <p:spPr bwMode="auto">
           <a:xfrm>
-            <a:off x="92202" y="3265071"/>
-            <a:ext cx="2705100" cy="1685925"/>
+            <a:off x="3374828" y="2229368"/>
+            <a:ext cx="2971801" cy="1362075"/>
           </a:xfrm>
           <a:prstGeom prst="rect">
             <a:avLst/>
@@ -13672,10 +14535,10 @@
       </p:pic>
       <p:pic>
         <p:nvPicPr>
-          <p:cNvPr id="2054" name="Picture 6" descr="pandas (software) - Wikipedia">
+          <p:cNvPr id="2056" name="Picture 8" descr="IllustrisTNG - Data Access - FAQ">
             <a:extLst>
               <a:ext uri="{FF2B5EF4-FFF2-40B4-BE49-F238E27FC236}">
-                <a16:creationId xmlns:a16="http://schemas.microsoft.com/office/drawing/2014/main" id="{AA99AE6B-833D-4475-AC09-D6E1BAB37510}"/>
+                <a16:creationId xmlns:a16="http://schemas.microsoft.com/office/drawing/2014/main" id="{5646EDEF-20FF-494D-8AB2-39E0414E80F3}"/>
               </a:ext>
             </a:extLst>
           </p:cNvPr>
@@ -13699,8 +14562,8 @@
         </p:blipFill>
         <p:spPr bwMode="auto">
           <a:xfrm>
-            <a:off x="3023189" y="3327145"/>
-            <a:ext cx="2971801" cy="1362075"/>
+            <a:off x="353360" y="4057468"/>
+            <a:ext cx="3171825" cy="1438275"/>
           </a:xfrm>
           <a:prstGeom prst="rect">
             <a:avLst/>
@@ -13719,10 +14582,10 @@
       </p:pic>
       <p:pic>
         <p:nvPicPr>
-          <p:cNvPr id="2056" name="Picture 8" descr="IllustrisTNG - Data Access - FAQ">
+          <p:cNvPr id="2058" name="Picture 10" descr="Curso intensivo de Python NumPy: Como construir arreglos n-dimensionales  para aprendizaje automático">
             <a:extLst>
               <a:ext uri="{FF2B5EF4-FFF2-40B4-BE49-F238E27FC236}">
-                <a16:creationId xmlns:a16="http://schemas.microsoft.com/office/drawing/2014/main" id="{5646EDEF-20FF-494D-8AB2-39E0414E80F3}"/>
+                <a16:creationId xmlns:a16="http://schemas.microsoft.com/office/drawing/2014/main" id="{A7EF72CD-1159-4694-BF93-D2CDD55498E9}"/>
               </a:ext>
             </a:extLst>
           </p:cNvPr>
@@ -13746,54 +14609,7 @@
         </p:blipFill>
         <p:spPr bwMode="auto">
           <a:xfrm>
-            <a:off x="575050" y="5011218"/>
-            <a:ext cx="3171825" cy="1438275"/>
-          </a:xfrm>
-          <a:prstGeom prst="rect">
-            <a:avLst/>
-          </a:prstGeom>
-          <a:noFill/>
-          <a:extLst>
-            <a:ext uri="{909E8E84-426E-40DD-AFC4-6F175D3DCCD1}">
-              <a14:hiddenFill xmlns:a14="http://schemas.microsoft.com/office/drawing/2010/main">
-                <a:solidFill>
-                  <a:srgbClr val="FFFFFF"/>
-                </a:solidFill>
-              </a14:hiddenFill>
-            </a:ext>
-          </a:extLst>
-        </p:spPr>
-      </p:pic>
-      <p:pic>
-        <p:nvPicPr>
-          <p:cNvPr id="2058" name="Picture 10" descr="Curso intensivo de Python NumPy: Como construir arreglos n-dimensionales  para aprendizaje automático">
-            <a:extLst>
-              <a:ext uri="{FF2B5EF4-FFF2-40B4-BE49-F238E27FC236}">
-                <a16:creationId xmlns:a16="http://schemas.microsoft.com/office/drawing/2014/main" id="{A7EF72CD-1159-4694-BF93-D2CDD55498E9}"/>
-              </a:ext>
-            </a:extLst>
-          </p:cNvPr>
-          <p:cNvPicPr>
-            <a:picLocks noChangeAspect="1" noChangeArrowheads="1"/>
-          </p:cNvPicPr>
-          <p:nvPr/>
-        </p:nvPicPr>
-        <p:blipFill>
-          <a:blip r:embed="rId10">
-            <a:extLst>
-              <a:ext uri="{28A0092B-C50C-407E-A947-70E740481C1C}">
-                <a14:useLocalDpi xmlns:a14="http://schemas.microsoft.com/office/drawing/2010/main" val="0"/>
-              </a:ext>
-            </a:extLst>
-          </a:blip>
-          <a:srcRect/>
-          <a:stretch>
-            <a:fillRect/>
-          </a:stretch>
-        </p:blipFill>
-        <p:spPr bwMode="auto">
-          <a:xfrm>
-            <a:off x="3561718" y="4860038"/>
+            <a:off x="3421137" y="4158601"/>
             <a:ext cx="3309779" cy="1399787"/>
           </a:xfrm>
           <a:prstGeom prst="rect">
@@ -13811,250 +14627,6 @@
           </a:extLst>
         </p:spPr>
       </p:pic>
-    </p:spTree>
-  </p:cSld>
-  <p:clrMapOvr>
-    <a:masterClrMapping/>
-  </p:clrMapOvr>
-</p:sld>
-</file>
-
-<file path=ppt/slides/slide9.xml><?xml version="1.0" encoding="utf-8"?>
-<p:sld xmlns:a="http://schemas.openxmlformats.org/drawingml/2006/main" xmlns:r="http://schemas.openxmlformats.org/officeDocument/2006/relationships" xmlns:p="http://schemas.openxmlformats.org/presentationml/2006/main">
-  <p:cSld>
-    <p:bg>
-      <p:bgPr>
-        <a:solidFill>
-          <a:srgbClr val="4B22F4"/>
-        </a:solidFill>
-        <a:effectLst/>
-      </p:bgPr>
-    </p:bg>
-    <p:spTree>
-      <p:nvGrpSpPr>
-        <p:cNvPr id="1" name="Shape 375"/>
-        <p:cNvGrpSpPr/>
-        <p:nvPr/>
-      </p:nvGrpSpPr>
-      <p:grpSpPr>
-        <a:xfrm>
-          <a:off x="0" y="0"/>
-          <a:ext cx="0" cy="0"/>
-          <a:chOff x="0" y="0"/>
-          <a:chExt cx="0" cy="0"/>
-        </a:xfrm>
-      </p:grpSpPr>
-      <p:pic>
-        <p:nvPicPr>
-          <p:cNvPr id="427" name="Google Shape;427;g7ed7eb645d_0_992"/>
-          <p:cNvPicPr preferRelativeResize="0"/>
-          <p:nvPr/>
-        </p:nvPicPr>
-        <p:blipFill rotWithShape="1">
-          <a:blip r:embed="rId3">
-            <a:alphaModFix/>
-          </a:blip>
-          <a:srcRect/>
-          <a:stretch/>
-        </p:blipFill>
-        <p:spPr>
-          <a:xfrm flipH="1">
-            <a:off x="498499" y="731301"/>
-            <a:ext cx="1430575" cy="82989"/>
-          </a:xfrm>
-          <a:prstGeom prst="rect">
-            <a:avLst/>
-          </a:prstGeom>
-          <a:noFill/>
-          <a:ln>
-            <a:noFill/>
-          </a:ln>
-        </p:spPr>
-      </p:pic>
-      <p:sp>
-        <p:nvSpPr>
-          <p:cNvPr id="428" name="Google Shape;428;g7ed7eb645d_0_992"/>
-          <p:cNvSpPr txBox="1"/>
-          <p:nvPr/>
-        </p:nvSpPr>
-        <p:spPr>
-          <a:xfrm>
-            <a:off x="5257444" y="3893494"/>
-            <a:ext cx="9218400" cy="716700"/>
-          </a:xfrm>
-          <a:prstGeom prst="rect">
-            <a:avLst/>
-          </a:prstGeom>
-          <a:noFill/>
-          <a:ln>
-            <a:noFill/>
-          </a:ln>
-        </p:spPr>
-        <p:txBody>
-          <a:bodyPr spcFirstLastPara="1" wrap="square" lIns="147725" tIns="147725" rIns="147725" bIns="147725" anchor="ctr" anchorCtr="0">
-            <a:noAutofit/>
-          </a:bodyPr>
-          <a:lstStyle/>
-          <a:p>
-            <a:pPr marL="0" marR="0" lvl="0" indent="0" algn="l" rtl="0">
-              <a:lnSpc>
-                <a:spcPct val="100000"/>
-              </a:lnSpc>
-              <a:spcBef>
-                <a:spcPts val="0"/>
-              </a:spcBef>
-              <a:spcAft>
-                <a:spcPts val="0"/>
-              </a:spcAft>
-              <a:buClr>
-                <a:srgbClr val="000000"/>
-              </a:buClr>
-              <a:buSzPts val="4000"/>
-              <a:buFont typeface="Arial"/>
-              <a:buNone/>
-            </a:pPr>
-            <a:r>
-              <a:rPr lang="es-MX" sz="4000" b="1" i="0" u="none" strike="noStrike" cap="none" dirty="0">
-                <a:solidFill>
-                  <a:schemeClr val="lt1"/>
-                </a:solidFill>
-                <a:latin typeface="Montserrat"/>
-                <a:ea typeface="Montserrat"/>
-                <a:cs typeface="Montserrat"/>
-                <a:sym typeface="Montserrat"/>
-              </a:rPr>
-              <a:t>Muchas gracias</a:t>
-            </a:r>
-            <a:endParaRPr sz="4000" b="0" i="0" u="none" strike="noStrike" cap="none" dirty="0">
-              <a:solidFill>
-                <a:schemeClr val="lt1"/>
-              </a:solidFill>
-              <a:latin typeface="Montserrat"/>
-              <a:ea typeface="Montserrat"/>
-              <a:cs typeface="Montserrat"/>
-              <a:sym typeface="Montserrat"/>
-            </a:endParaRPr>
-          </a:p>
-        </p:txBody>
-      </p:sp>
-      <p:cxnSp>
-        <p:nvCxnSpPr>
-          <p:cNvPr id="429" name="Google Shape;429;g7ed7eb645d_0_992"/>
-          <p:cNvCxnSpPr/>
-          <p:nvPr/>
-        </p:nvCxnSpPr>
-        <p:spPr>
-          <a:xfrm>
-            <a:off x="14475844" y="-11"/>
-            <a:ext cx="0" cy="3877500"/>
-          </a:xfrm>
-          <a:prstGeom prst="straightConnector1">
-            <a:avLst/>
-          </a:prstGeom>
-          <a:noFill/>
-          <a:ln w="19050" cap="flat" cmpd="sng">
-            <a:solidFill>
-              <a:srgbClr val="6349FC"/>
-            </a:solidFill>
-            <a:prstDash val="solid"/>
-            <a:round/>
-            <a:headEnd type="none" w="sm" len="sm"/>
-            <a:tailEnd type="none" w="sm" len="sm"/>
-          </a:ln>
-        </p:spPr>
-      </p:cxnSp>
-      <p:cxnSp>
-        <p:nvCxnSpPr>
-          <p:cNvPr id="430" name="Google Shape;430;g7ed7eb645d_0_992"/>
-          <p:cNvCxnSpPr/>
-          <p:nvPr/>
-        </p:nvCxnSpPr>
-        <p:spPr>
-          <a:xfrm>
-            <a:off x="14475850" y="6859925"/>
-            <a:ext cx="0" cy="1061700"/>
-          </a:xfrm>
-          <a:prstGeom prst="straightConnector1">
-            <a:avLst/>
-          </a:prstGeom>
-          <a:noFill/>
-          <a:ln w="19050" cap="flat" cmpd="sng">
-            <a:solidFill>
-              <a:srgbClr val="6349FC"/>
-            </a:solidFill>
-            <a:prstDash val="solid"/>
-            <a:round/>
-            <a:headEnd type="none" w="sm" len="sm"/>
-            <a:tailEnd type="none" w="sm" len="sm"/>
-          </a:ln>
-        </p:spPr>
-      </p:cxnSp>
-      <p:sp>
-        <p:nvSpPr>
-          <p:cNvPr id="431" name="Google Shape;431;g7ed7eb645d_0_992"/>
-          <p:cNvSpPr txBox="1"/>
-          <p:nvPr/>
-        </p:nvSpPr>
-        <p:spPr>
-          <a:xfrm rot="-5400000">
-            <a:off x="12971200" y="5038125"/>
-            <a:ext cx="3009300" cy="657900"/>
-          </a:xfrm>
-          <a:prstGeom prst="rect">
-            <a:avLst/>
-          </a:prstGeom>
-          <a:noFill/>
-          <a:ln>
-            <a:noFill/>
-          </a:ln>
-        </p:spPr>
-        <p:txBody>
-          <a:bodyPr spcFirstLastPara="1" wrap="square" lIns="147725" tIns="147725" rIns="147725" bIns="147725" anchor="t" anchorCtr="0">
-            <a:noAutofit/>
-          </a:bodyPr>
-          <a:lstStyle/>
-          <a:p>
-            <a:pPr marL="0" marR="0" lvl="0" indent="0" algn="ctr" rtl="0">
-              <a:lnSpc>
-                <a:spcPct val="100000"/>
-              </a:lnSpc>
-              <a:spcBef>
-                <a:spcPts val="0"/>
-              </a:spcBef>
-              <a:spcAft>
-                <a:spcPts val="0"/>
-              </a:spcAft>
-              <a:buClr>
-                <a:srgbClr val="000000"/>
-              </a:buClr>
-              <a:buSzPts val="2300"/>
-              <a:buFont typeface="Arial"/>
-              <a:buNone/>
-            </a:pPr>
-            <a:r>
-              <a:rPr lang="es-MX" sz="2300" b="0" i="0" u="none" strike="noStrike" cap="none">
-                <a:solidFill>
-                  <a:schemeClr val="lt1"/>
-                </a:solidFill>
-                <a:latin typeface="Montserrat"/>
-                <a:ea typeface="Montserrat"/>
-                <a:cs typeface="Montserrat"/>
-                <a:sym typeface="Montserrat"/>
-              </a:rPr>
-              <a:t>Fondo de color</a:t>
-            </a:r>
-            <a:endParaRPr sz="2300" b="0" i="0" u="none" strike="noStrike" cap="none">
-              <a:solidFill>
-                <a:schemeClr val="lt1"/>
-              </a:solidFill>
-              <a:latin typeface="Montserrat"/>
-              <a:ea typeface="Montserrat"/>
-              <a:cs typeface="Montserrat"/>
-              <a:sym typeface="Montserrat"/>
-            </a:endParaRPr>
-          </a:p>
-        </p:txBody>
-      </p:sp>
     </p:spTree>
   </p:cSld>
   <p:clrMapOvr>

</xml_diff>